<commit_message>
Jae adding updates to deck
</commit_message>
<xml_diff>
--- a/Presentation1.pptx
+++ b/Presentation1.pptx
@@ -5,20 +5,30 @@
     <p:sldMasterId id="2147483660" r:id="rId1"/>
   </p:sldMasterIdLst>
   <p:sldIdLst>
-    <p:sldId id="258" r:id="rId2"/>
-    <p:sldId id="257" r:id="rId3"/>
-    <p:sldId id="259" r:id="rId4"/>
-    <p:sldId id="268" r:id="rId5"/>
-    <p:sldId id="266" r:id="rId6"/>
-    <p:sldId id="267" r:id="rId7"/>
-    <p:sldId id="260" r:id="rId8"/>
-    <p:sldId id="261" r:id="rId9"/>
-    <p:sldId id="263" r:id="rId10"/>
-    <p:sldId id="262" r:id="rId11"/>
-    <p:sldId id="264" r:id="rId12"/>
-    <p:sldId id="265" r:id="rId13"/>
-    <p:sldId id="269" r:id="rId14"/>
-    <p:sldId id="270" r:id="rId15"/>
+    <p:sldId id="256" r:id="rId2"/>
+    <p:sldId id="275" r:id="rId3"/>
+    <p:sldId id="276" r:id="rId4"/>
+    <p:sldId id="277" r:id="rId5"/>
+    <p:sldId id="258" r:id="rId6"/>
+    <p:sldId id="257" r:id="rId7"/>
+    <p:sldId id="259" r:id="rId8"/>
+    <p:sldId id="268" r:id="rId9"/>
+    <p:sldId id="266" r:id="rId10"/>
+    <p:sldId id="267" r:id="rId11"/>
+    <p:sldId id="260" r:id="rId12"/>
+    <p:sldId id="261" r:id="rId13"/>
+    <p:sldId id="263" r:id="rId14"/>
+    <p:sldId id="262" r:id="rId15"/>
+    <p:sldId id="264" r:id="rId16"/>
+    <p:sldId id="265" r:id="rId17"/>
+    <p:sldId id="269" r:id="rId18"/>
+    <p:sldId id="270" r:id="rId19"/>
+    <p:sldId id="271" r:id="rId20"/>
+    <p:sldId id="272" r:id="rId21"/>
+    <p:sldId id="273" r:id="rId22"/>
+    <p:sldId id="274" r:id="rId23"/>
+    <p:sldId id="278" r:id="rId24"/>
+    <p:sldId id="279" r:id="rId25"/>
   </p:sldIdLst>
   <p:sldSz cx="12192000" cy="6858000"/>
   <p:notesSz cx="6858000" cy="9144000"/>
@@ -117,6 +127,11 @@
       </a:defRPr>
     </a:lvl9pPr>
   </p:defaultTextStyle>
+  <p:extLst>
+    <p:ext uri="{EFAFB233-063F-42B5-8137-9DF3F51BA10A}">
+      <p15:sldGuideLst xmlns:p15="http://schemas.microsoft.com/office/powerpoint/2012/main"/>
+    </p:ext>
+  </p:extLst>
 </p:presentation>
 </file>
 
@@ -842,7 +857,7 @@
           <a:p>
             <a:fld id="{010A7FB3-A316-402C-99FC-ECFF33919AD8}" type="datetimeFigureOut">
               <a:rPr lang="en-US" smtClean="0"/>
-              <a:t>4/11/2019</a:t>
+              <a:t>4/11/19</a:t>
             </a:fld>
             <a:endParaRPr lang="en-US"/>
           </a:p>
@@ -1093,7 +1108,7 @@
           <a:p>
             <a:fld id="{010A7FB3-A316-402C-99FC-ECFF33919AD8}" type="datetimeFigureOut">
               <a:rPr lang="en-US" smtClean="0"/>
-              <a:t>4/11/2019</a:t>
+              <a:t>4/11/19</a:t>
             </a:fld>
             <a:endParaRPr lang="en-US"/>
           </a:p>
@@ -1407,7 +1422,7 @@
           <a:p>
             <a:fld id="{010A7FB3-A316-402C-99FC-ECFF33919AD8}" type="datetimeFigureOut">
               <a:rPr lang="en-US" smtClean="0"/>
-              <a:t>4/11/2019</a:t>
+              <a:t>4/11/19</a:t>
             </a:fld>
             <a:endParaRPr lang="en-US"/>
           </a:p>
@@ -1748,7 +1763,7 @@
           <a:p>
             <a:fld id="{010A7FB3-A316-402C-99FC-ECFF33919AD8}" type="datetimeFigureOut">
               <a:rPr lang="en-US" smtClean="0"/>
-              <a:t>4/11/2019</a:t>
+              <a:t>4/11/19</a:t>
             </a:fld>
             <a:endParaRPr lang="en-US"/>
           </a:p>
@@ -2062,7 +2077,7 @@
           <a:p>
             <a:fld id="{010A7FB3-A316-402C-99FC-ECFF33919AD8}" type="datetimeFigureOut">
               <a:rPr lang="en-US" smtClean="0"/>
-              <a:t>4/11/2019</a:t>
+              <a:t>4/11/19</a:t>
             </a:fld>
             <a:endParaRPr lang="en-US"/>
           </a:p>
@@ -2455,7 +2470,7 @@
           <a:p>
             <a:fld id="{010A7FB3-A316-402C-99FC-ECFF33919AD8}" type="datetimeFigureOut">
               <a:rPr lang="en-US" smtClean="0"/>
-              <a:t>4/11/2019</a:t>
+              <a:t>4/11/19</a:t>
             </a:fld>
             <a:endParaRPr lang="en-US"/>
           </a:p>
@@ -2625,7 +2640,7 @@
           <a:p>
             <a:fld id="{010A7FB3-A316-402C-99FC-ECFF33919AD8}" type="datetimeFigureOut">
               <a:rPr lang="en-US" smtClean="0"/>
-              <a:t>4/11/2019</a:t>
+              <a:t>4/11/19</a:t>
             </a:fld>
             <a:endParaRPr lang="en-US"/>
           </a:p>
@@ -2805,7 +2820,7 @@
           <a:p>
             <a:fld id="{010A7FB3-A316-402C-99FC-ECFF33919AD8}" type="datetimeFigureOut">
               <a:rPr lang="en-US" smtClean="0"/>
-              <a:t>4/11/2019</a:t>
+              <a:t>4/11/19</a:t>
             </a:fld>
             <a:endParaRPr lang="en-US"/>
           </a:p>
@@ -2981,7 +2996,7 @@
           <a:p>
             <a:fld id="{010A7FB3-A316-402C-99FC-ECFF33919AD8}" type="datetimeFigureOut">
               <a:rPr lang="en-US" smtClean="0"/>
-              <a:t>4/11/2019</a:t>
+              <a:t>4/11/19</a:t>
             </a:fld>
             <a:endParaRPr lang="en-US"/>
           </a:p>
@@ -3228,7 +3243,7 @@
           <a:p>
             <a:fld id="{010A7FB3-A316-402C-99FC-ECFF33919AD8}" type="datetimeFigureOut">
               <a:rPr lang="en-US" smtClean="0"/>
-              <a:t>4/11/2019</a:t>
+              <a:t>4/11/19</a:t>
             </a:fld>
             <a:endParaRPr lang="en-US"/>
           </a:p>
@@ -3460,7 +3475,7 @@
           <a:p>
             <a:fld id="{010A7FB3-A316-402C-99FC-ECFF33919AD8}" type="datetimeFigureOut">
               <a:rPr lang="en-US" smtClean="0"/>
-              <a:t>4/11/2019</a:t>
+              <a:t>4/11/19</a:t>
             </a:fld>
             <a:endParaRPr lang="en-US"/>
           </a:p>
@@ -3834,7 +3849,7 @@
           <a:p>
             <a:fld id="{010A7FB3-A316-402C-99FC-ECFF33919AD8}" type="datetimeFigureOut">
               <a:rPr lang="en-US" smtClean="0"/>
-              <a:t>4/11/2019</a:t>
+              <a:t>4/11/19</a:t>
             </a:fld>
             <a:endParaRPr lang="en-US"/>
           </a:p>
@@ -3957,7 +3972,7 @@
           <a:p>
             <a:fld id="{010A7FB3-A316-402C-99FC-ECFF33919AD8}" type="datetimeFigureOut">
               <a:rPr lang="en-US" smtClean="0"/>
-              <a:t>4/11/2019</a:t>
+              <a:t>4/11/19</a:t>
             </a:fld>
             <a:endParaRPr lang="en-US"/>
           </a:p>
@@ -4052,7 +4067,7 @@
           <a:p>
             <a:fld id="{010A7FB3-A316-402C-99FC-ECFF33919AD8}" type="datetimeFigureOut">
               <a:rPr lang="en-US" smtClean="0"/>
-              <a:t>4/11/2019</a:t>
+              <a:t>4/11/19</a:t>
             </a:fld>
             <a:endParaRPr lang="en-US"/>
           </a:p>
@@ -4307,7 +4322,7 @@
           <a:p>
             <a:fld id="{010A7FB3-A316-402C-99FC-ECFF33919AD8}" type="datetimeFigureOut">
               <a:rPr lang="en-US" smtClean="0"/>
-              <a:t>4/11/2019</a:t>
+              <a:t>4/11/19</a:t>
             </a:fld>
             <a:endParaRPr lang="en-US"/>
           </a:p>
@@ -4570,7 +4585,7 @@
           <a:p>
             <a:fld id="{010A7FB3-A316-402C-99FC-ECFF33919AD8}" type="datetimeFigureOut">
               <a:rPr lang="en-US" smtClean="0"/>
-              <a:t>4/11/2019</a:t>
+              <a:t>4/11/19</a:t>
             </a:fld>
             <a:endParaRPr lang="en-US"/>
           </a:p>
@@ -5313,7 +5328,7 @@
           <a:p>
             <a:fld id="{010A7FB3-A316-402C-99FC-ECFF33919AD8}" type="datetimeFigureOut">
               <a:rPr lang="en-US" smtClean="0"/>
-              <a:t>4/11/2019</a:t>
+              <a:t>4/11/19</a:t>
             </a:fld>
             <a:endParaRPr lang="en-US"/>
           </a:p>
@@ -5842,7 +5857,117 @@
           <p:cNvPr id="2" name="Title 1">
             <a:extLst>
               <a:ext uri="{FF2B5EF4-FFF2-40B4-BE49-F238E27FC236}">
-                <a16:creationId xmlns:a16="http://schemas.microsoft.com/office/drawing/2014/main" id="{574F119C-EEA3-4EB2-BE31-F79ACAB60D87}"/>
+                <a16:creationId xmlns:a16="http://schemas.microsoft.com/office/drawing/2014/main" id="{334242BA-58D2-468F-A973-6EA5A69E653A}"/>
+              </a:ext>
+            </a:extLst>
+          </p:cNvPr>
+          <p:cNvSpPr>
+            <a:spLocks noGrp="1"/>
+          </p:cNvSpPr>
+          <p:nvPr>
+            <p:ph type="ctrTitle"/>
+          </p:nvPr>
+        </p:nvSpPr>
+        <p:spPr/>
+        <p:txBody>
+          <a:bodyPr/>
+          <a:lstStyle/>
+          <a:p>
+            <a:r>
+              <a:rPr lang="en-US" dirty="0"/>
+              <a:t>Electric Vehicles</a:t>
+            </a:r>
+          </a:p>
+        </p:txBody>
+      </p:sp>
+      <p:sp>
+        <p:nvSpPr>
+          <p:cNvPr id="3" name="Subtitle 2">
+            <a:extLst>
+              <a:ext uri="{FF2B5EF4-FFF2-40B4-BE49-F238E27FC236}">
+                <a16:creationId xmlns:a16="http://schemas.microsoft.com/office/drawing/2014/main" id="{50ACCC6B-2038-4C0A-A8FC-7D21F2B98A24}"/>
+              </a:ext>
+            </a:extLst>
+          </p:cNvPr>
+          <p:cNvSpPr>
+            <a:spLocks noGrp="1"/>
+          </p:cNvSpPr>
+          <p:nvPr>
+            <p:ph type="subTitle" idx="1"/>
+          </p:nvPr>
+        </p:nvSpPr>
+        <p:spPr/>
+        <p:txBody>
+          <a:bodyPr/>
+          <a:lstStyle/>
+          <a:p>
+            <a:r>
+              <a:rPr lang="en-US" dirty="0"/>
+              <a:t>Daniel </a:t>
+            </a:r>
+            <a:r>
+              <a:rPr lang="en-US" dirty="0" err="1"/>
+              <a:t>Mihok</a:t>
+            </a:r>
+            <a:r>
+              <a:rPr lang="en-US" dirty="0"/>
+              <a:t>, Erin Cunningham, Jae Lee, </a:t>
+            </a:r>
+            <a:r>
+              <a:rPr lang="en-US" dirty="0" err="1"/>
+              <a:t>Sirish</a:t>
+            </a:r>
+            <a:r>
+              <a:rPr lang="en-US" dirty="0"/>
+              <a:t> </a:t>
+            </a:r>
+            <a:r>
+              <a:rPr lang="en-US" dirty="0" err="1"/>
+              <a:t>Kanukunta</a:t>
+            </a:r>
+            <a:r>
+              <a:rPr lang="en-US" dirty="0"/>
+              <a:t> </a:t>
+            </a:r>
+          </a:p>
+        </p:txBody>
+      </p:sp>
+    </p:spTree>
+    <p:extLst>
+      <p:ext uri="{BB962C8B-B14F-4D97-AF65-F5344CB8AC3E}">
+        <p14:creationId xmlns:p14="http://schemas.microsoft.com/office/powerpoint/2010/main" val="1819358361"/>
+      </p:ext>
+    </p:extLst>
+  </p:cSld>
+  <p:clrMapOvr>
+    <a:masterClrMapping/>
+  </p:clrMapOvr>
+</p:sld>
+</file>
+
+<file path=ppt/slides/slide10.xml><?xml version="1.0" encoding="utf-8"?>
+<p:sld xmlns:a="http://schemas.openxmlformats.org/drawingml/2006/main" xmlns:r="http://schemas.openxmlformats.org/officeDocument/2006/relationships" xmlns:p="http://schemas.openxmlformats.org/presentationml/2006/main">
+  <p:cSld>
+    <p:spTree>
+      <p:nvGrpSpPr>
+        <p:cNvPr id="1" name=""/>
+        <p:cNvGrpSpPr/>
+        <p:nvPr/>
+      </p:nvGrpSpPr>
+      <p:grpSpPr>
+        <a:xfrm>
+          <a:off x="0" y="0"/>
+          <a:ext cx="0" cy="0"/>
+          <a:chOff x="0" y="0"/>
+          <a:chExt cx="0" cy="0"/>
+        </a:xfrm>
+      </p:grpSpPr>
+      <p:sp>
+        <p:nvSpPr>
+          <p:cNvPr id="2" name="Title 1">
+            <a:extLst>
+              <a:ext uri="{FF2B5EF4-FFF2-40B4-BE49-F238E27FC236}">
+                <a16:creationId xmlns:a16="http://schemas.microsoft.com/office/drawing/2014/main" id="{9F2FC880-1F23-4B21-BF8B-8F83C578D037}"/>
               </a:ext>
             </a:extLst>
           </p:cNvPr>
@@ -5867,7 +5992,7 @@
           <p:cNvPr id="5" name="Content Placeholder 4">
             <a:extLst>
               <a:ext uri="{FF2B5EF4-FFF2-40B4-BE49-F238E27FC236}">
-                <a16:creationId xmlns:a16="http://schemas.microsoft.com/office/drawing/2014/main" id="{5FD41C02-496E-4EAD-8354-CA8CA6457611}"/>
+                <a16:creationId xmlns:a16="http://schemas.microsoft.com/office/drawing/2014/main" id="{4C75B6EC-F102-41D3-8E7B-B9FC45CD8F9B}"/>
               </a:ext>
             </a:extLst>
           </p:cNvPr>
@@ -5892,15 +6017,15 @@
         </p:blipFill>
         <p:spPr>
           <a:xfrm>
-            <a:off x="677863" y="2310408"/>
-            <a:ext cx="8596312" cy="3581796"/>
+            <a:off x="265019" y="999424"/>
+            <a:ext cx="11661961" cy="4859151"/>
           </a:xfrm>
         </p:spPr>
       </p:pic>
     </p:spTree>
     <p:extLst>
       <p:ext uri="{BB962C8B-B14F-4D97-AF65-F5344CB8AC3E}">
-        <p14:creationId xmlns:p14="http://schemas.microsoft.com/office/powerpoint/2010/main" val="92396245"/>
+        <p14:creationId xmlns:p14="http://schemas.microsoft.com/office/powerpoint/2010/main" val="2348836302"/>
       </p:ext>
     </p:extLst>
   </p:cSld>
@@ -5910,7 +6035,276 @@
 </p:sld>
 </file>
 
-<file path=ppt/slides/slide10.xml><?xml version="1.0" encoding="utf-8"?>
+<file path=ppt/slides/slide11.xml><?xml version="1.0" encoding="utf-8"?>
+<p:sld xmlns:a="http://schemas.openxmlformats.org/drawingml/2006/main" xmlns:r="http://schemas.openxmlformats.org/officeDocument/2006/relationships" xmlns:p="http://schemas.openxmlformats.org/presentationml/2006/main">
+  <p:cSld>
+    <p:spTree>
+      <p:nvGrpSpPr>
+        <p:cNvPr id="1" name=""/>
+        <p:cNvGrpSpPr/>
+        <p:nvPr/>
+      </p:nvGrpSpPr>
+      <p:grpSpPr>
+        <a:xfrm>
+          <a:off x="0" y="0"/>
+          <a:ext cx="0" cy="0"/>
+          <a:chOff x="0" y="0"/>
+          <a:chExt cx="0" cy="0"/>
+        </a:xfrm>
+      </p:grpSpPr>
+      <p:sp>
+        <p:nvSpPr>
+          <p:cNvPr id="2" name="Title 1">
+            <a:extLst>
+              <a:ext uri="{FF2B5EF4-FFF2-40B4-BE49-F238E27FC236}">
+                <a16:creationId xmlns:a16="http://schemas.microsoft.com/office/drawing/2014/main" id="{6679D015-EEB7-44D6-9A8B-E5B1D27516E9}"/>
+              </a:ext>
+            </a:extLst>
+          </p:cNvPr>
+          <p:cNvSpPr>
+            <a:spLocks noGrp="1"/>
+          </p:cNvSpPr>
+          <p:nvPr>
+            <p:ph type="title"/>
+          </p:nvPr>
+        </p:nvSpPr>
+        <p:spPr/>
+        <p:txBody>
+          <a:bodyPr/>
+          <a:lstStyle/>
+          <a:p>
+            <a:endParaRPr lang="en-US"/>
+          </a:p>
+        </p:txBody>
+      </p:sp>
+      <p:pic>
+        <p:nvPicPr>
+          <p:cNvPr id="5" name="Content Placeholder 4">
+            <a:extLst>
+              <a:ext uri="{FF2B5EF4-FFF2-40B4-BE49-F238E27FC236}">
+                <a16:creationId xmlns:a16="http://schemas.microsoft.com/office/drawing/2014/main" id="{D03A0EDE-77F2-4981-849F-C23D3450E904}"/>
+              </a:ext>
+            </a:extLst>
+          </p:cNvPr>
+          <p:cNvPicPr>
+            <a:picLocks noGrp="1" noChangeAspect="1"/>
+          </p:cNvPicPr>
+          <p:nvPr>
+            <p:ph idx="1"/>
+          </p:nvPr>
+        </p:nvPicPr>
+        <p:blipFill>
+          <a:blip r:embed="rId2">
+            <a:extLst>
+              <a:ext uri="{28A0092B-C50C-407E-A947-70E740481C1C}">
+                <a14:useLocalDpi xmlns:a14="http://schemas.microsoft.com/office/drawing/2010/main" val="0"/>
+              </a:ext>
+            </a:extLst>
+          </a:blip>
+          <a:stretch>
+            <a:fillRect/>
+          </a:stretch>
+        </p:blipFill>
+        <p:spPr>
+          <a:xfrm>
+            <a:off x="1180694" y="623574"/>
+            <a:ext cx="9830611" cy="5610851"/>
+          </a:xfrm>
+        </p:spPr>
+      </p:pic>
+    </p:spTree>
+    <p:extLst>
+      <p:ext uri="{BB962C8B-B14F-4D97-AF65-F5344CB8AC3E}">
+        <p14:creationId xmlns:p14="http://schemas.microsoft.com/office/powerpoint/2010/main" val="2525985050"/>
+      </p:ext>
+    </p:extLst>
+  </p:cSld>
+  <p:clrMapOvr>
+    <a:masterClrMapping/>
+  </p:clrMapOvr>
+</p:sld>
+</file>
+
+<file path=ppt/slides/slide12.xml><?xml version="1.0" encoding="utf-8"?>
+<p:sld xmlns:a="http://schemas.openxmlformats.org/drawingml/2006/main" xmlns:r="http://schemas.openxmlformats.org/officeDocument/2006/relationships" xmlns:p="http://schemas.openxmlformats.org/presentationml/2006/main">
+  <p:cSld>
+    <p:spTree>
+      <p:nvGrpSpPr>
+        <p:cNvPr id="1" name=""/>
+        <p:cNvGrpSpPr/>
+        <p:nvPr/>
+      </p:nvGrpSpPr>
+      <p:grpSpPr>
+        <a:xfrm>
+          <a:off x="0" y="0"/>
+          <a:ext cx="0" cy="0"/>
+          <a:chOff x="0" y="0"/>
+          <a:chExt cx="0" cy="0"/>
+        </a:xfrm>
+      </p:grpSpPr>
+      <p:sp>
+        <p:nvSpPr>
+          <p:cNvPr id="2" name="Title 1">
+            <a:extLst>
+              <a:ext uri="{FF2B5EF4-FFF2-40B4-BE49-F238E27FC236}">
+                <a16:creationId xmlns:a16="http://schemas.microsoft.com/office/drawing/2014/main" id="{F100986A-2B16-4D98-8296-3807E41CA447}"/>
+              </a:ext>
+            </a:extLst>
+          </p:cNvPr>
+          <p:cNvSpPr>
+            <a:spLocks noGrp="1"/>
+          </p:cNvSpPr>
+          <p:nvPr>
+            <p:ph type="title"/>
+          </p:nvPr>
+        </p:nvSpPr>
+        <p:spPr/>
+        <p:txBody>
+          <a:bodyPr/>
+          <a:lstStyle/>
+          <a:p>
+            <a:endParaRPr lang="en-US"/>
+          </a:p>
+        </p:txBody>
+      </p:sp>
+      <p:pic>
+        <p:nvPicPr>
+          <p:cNvPr id="5" name="Content Placeholder 4">
+            <a:extLst>
+              <a:ext uri="{FF2B5EF4-FFF2-40B4-BE49-F238E27FC236}">
+                <a16:creationId xmlns:a16="http://schemas.microsoft.com/office/drawing/2014/main" id="{42DFD729-14D3-4FC7-937B-950F03115C26}"/>
+              </a:ext>
+            </a:extLst>
+          </p:cNvPr>
+          <p:cNvPicPr>
+            <a:picLocks noGrp="1" noChangeAspect="1"/>
+          </p:cNvPicPr>
+          <p:nvPr>
+            <p:ph idx="1"/>
+          </p:nvPr>
+        </p:nvPicPr>
+        <p:blipFill>
+          <a:blip r:embed="rId2">
+            <a:extLst>
+              <a:ext uri="{28A0092B-C50C-407E-A947-70E740481C1C}">
+                <a14:useLocalDpi xmlns:a14="http://schemas.microsoft.com/office/drawing/2010/main" val="0"/>
+              </a:ext>
+            </a:extLst>
+          </a:blip>
+          <a:stretch>
+            <a:fillRect/>
+          </a:stretch>
+        </p:blipFill>
+        <p:spPr>
+          <a:xfrm>
+            <a:off x="1267327" y="129465"/>
+            <a:ext cx="9898604" cy="6599069"/>
+          </a:xfrm>
+        </p:spPr>
+      </p:pic>
+    </p:spTree>
+    <p:extLst>
+      <p:ext uri="{BB962C8B-B14F-4D97-AF65-F5344CB8AC3E}">
+        <p14:creationId xmlns:p14="http://schemas.microsoft.com/office/powerpoint/2010/main" val="1855985092"/>
+      </p:ext>
+    </p:extLst>
+  </p:cSld>
+  <p:clrMapOvr>
+    <a:masterClrMapping/>
+  </p:clrMapOvr>
+</p:sld>
+</file>
+
+<file path=ppt/slides/slide13.xml><?xml version="1.0" encoding="utf-8"?>
+<p:sld xmlns:a="http://schemas.openxmlformats.org/drawingml/2006/main" xmlns:r="http://schemas.openxmlformats.org/officeDocument/2006/relationships" xmlns:p="http://schemas.openxmlformats.org/presentationml/2006/main">
+  <p:cSld>
+    <p:spTree>
+      <p:nvGrpSpPr>
+        <p:cNvPr id="1" name=""/>
+        <p:cNvGrpSpPr/>
+        <p:nvPr/>
+      </p:nvGrpSpPr>
+      <p:grpSpPr>
+        <a:xfrm>
+          <a:off x="0" y="0"/>
+          <a:ext cx="0" cy="0"/>
+          <a:chOff x="0" y="0"/>
+          <a:chExt cx="0" cy="0"/>
+        </a:xfrm>
+      </p:grpSpPr>
+      <p:sp>
+        <p:nvSpPr>
+          <p:cNvPr id="2" name="Title 1">
+            <a:extLst>
+              <a:ext uri="{FF2B5EF4-FFF2-40B4-BE49-F238E27FC236}">
+                <a16:creationId xmlns:a16="http://schemas.microsoft.com/office/drawing/2014/main" id="{7E781093-2703-4C82-9B8F-C3E838AF4A95}"/>
+              </a:ext>
+            </a:extLst>
+          </p:cNvPr>
+          <p:cNvSpPr>
+            <a:spLocks noGrp="1"/>
+          </p:cNvSpPr>
+          <p:nvPr>
+            <p:ph type="title"/>
+          </p:nvPr>
+        </p:nvSpPr>
+        <p:spPr/>
+        <p:txBody>
+          <a:bodyPr/>
+          <a:lstStyle/>
+          <a:p>
+            <a:endParaRPr lang="en-US"/>
+          </a:p>
+        </p:txBody>
+      </p:sp>
+      <p:pic>
+        <p:nvPicPr>
+          <p:cNvPr id="5" name="Content Placeholder 4">
+            <a:extLst>
+              <a:ext uri="{FF2B5EF4-FFF2-40B4-BE49-F238E27FC236}">
+                <a16:creationId xmlns:a16="http://schemas.microsoft.com/office/drawing/2014/main" id="{110EC511-B753-4FA0-AD33-2FC81B57351C}"/>
+              </a:ext>
+            </a:extLst>
+          </p:cNvPr>
+          <p:cNvPicPr>
+            <a:picLocks noGrp="1" noChangeAspect="1"/>
+          </p:cNvPicPr>
+          <p:nvPr>
+            <p:ph idx="1"/>
+          </p:nvPr>
+        </p:nvPicPr>
+        <p:blipFill rotWithShape="1">
+          <a:blip r:embed="rId2">
+            <a:extLst>
+              <a:ext uri="{28A0092B-C50C-407E-A947-70E740481C1C}">
+                <a14:useLocalDpi xmlns:a14="http://schemas.microsoft.com/office/drawing/2010/main" val="0"/>
+              </a:ext>
+            </a:extLst>
+          </a:blip>
+          <a:srcRect l="6687" r="7719"/>
+          <a:stretch/>
+        </p:blipFill>
+        <p:spPr>
+          <a:xfrm>
+            <a:off x="100523" y="365125"/>
+            <a:ext cx="12091477" cy="5889207"/>
+          </a:xfrm>
+        </p:spPr>
+      </p:pic>
+    </p:spTree>
+    <p:extLst>
+      <p:ext uri="{BB962C8B-B14F-4D97-AF65-F5344CB8AC3E}">
+        <p14:creationId xmlns:p14="http://schemas.microsoft.com/office/powerpoint/2010/main" val="2484642320"/>
+      </p:ext>
+    </p:extLst>
+  </p:cSld>
+  <p:clrMapOvr>
+    <a:masterClrMapping/>
+  </p:clrMapOvr>
+</p:sld>
+</file>
+
+<file path=ppt/slides/slide14.xml><?xml version="1.0" encoding="utf-8"?>
 <p:sld xmlns:a="http://schemas.openxmlformats.org/drawingml/2006/main" xmlns:r="http://schemas.openxmlformats.org/officeDocument/2006/relationships" xmlns:p="http://schemas.openxmlformats.org/presentationml/2006/main">
   <p:cSld>
     <p:spTree>
@@ -6000,7 +6394,7 @@
 </p:sld>
 </file>
 
-<file path=ppt/slides/slide11.xml><?xml version="1.0" encoding="utf-8"?>
+<file path=ppt/slides/slide15.xml><?xml version="1.0" encoding="utf-8"?>
 <p:sld xmlns:a="http://schemas.openxmlformats.org/drawingml/2006/main" xmlns:r="http://schemas.openxmlformats.org/officeDocument/2006/relationships" xmlns:p="http://schemas.openxmlformats.org/presentationml/2006/main">
   <p:cSld>
     <p:spTree>
@@ -6090,7 +6484,7 @@
 </p:sld>
 </file>
 
-<file path=ppt/slides/slide12.xml><?xml version="1.0" encoding="utf-8"?>
+<file path=ppt/slides/slide16.xml><?xml version="1.0" encoding="utf-8"?>
 <p:sld xmlns:a="http://schemas.openxmlformats.org/drawingml/2006/main" xmlns:r="http://schemas.openxmlformats.org/officeDocument/2006/relationships" xmlns:p="http://schemas.openxmlformats.org/presentationml/2006/main">
   <p:cSld>
     <p:spTree>
@@ -6214,7 +6608,7 @@
 </p:sld>
 </file>
 
-<file path=ppt/slides/slide13.xml><?xml version="1.0" encoding="utf-8"?>
+<file path=ppt/slides/slide17.xml><?xml version="1.0" encoding="utf-8"?>
 <p:sld xmlns:a="http://schemas.openxmlformats.org/drawingml/2006/main" xmlns:r="http://schemas.openxmlformats.org/officeDocument/2006/relationships" xmlns:p="http://schemas.openxmlformats.org/presentationml/2006/main">
   <p:cSld>
     <p:spTree>
@@ -6303,7 +6697,7 @@
 </p:sld>
 </file>
 
-<file path=ppt/slides/slide14.xml><?xml version="1.0" encoding="utf-8"?>
+<file path=ppt/slides/slide18.xml><?xml version="1.0" encoding="utf-8"?>
 <p:sld xmlns:a="http://schemas.openxmlformats.org/drawingml/2006/main" xmlns:r="http://schemas.openxmlformats.org/officeDocument/2006/relationships" xmlns:p="http://schemas.openxmlformats.org/presentationml/2006/main">
   <p:cSld>
     <p:spTree>
@@ -6392,7 +6786,1461 @@
 </p:sld>
 </file>
 
+<file path=ppt/slides/slide19.xml><?xml version="1.0" encoding="utf-8"?>
+<p:sld xmlns:a="http://schemas.openxmlformats.org/drawingml/2006/main" xmlns:r="http://schemas.openxmlformats.org/officeDocument/2006/relationships" xmlns:p="http://schemas.openxmlformats.org/presentationml/2006/main">
+  <p:cSld>
+    <p:spTree>
+      <p:nvGrpSpPr>
+        <p:cNvPr id="1" name=""/>
+        <p:cNvGrpSpPr/>
+        <p:nvPr/>
+      </p:nvGrpSpPr>
+      <p:grpSpPr>
+        <a:xfrm>
+          <a:off x="0" y="0"/>
+          <a:ext cx="0" cy="0"/>
+          <a:chOff x="0" y="0"/>
+          <a:chExt cx="0" cy="0"/>
+        </a:xfrm>
+      </p:grpSpPr>
+      <p:sp>
+        <p:nvSpPr>
+          <p:cNvPr id="2" name="Title 1">
+            <a:extLst>
+              <a:ext uri="{FF2B5EF4-FFF2-40B4-BE49-F238E27FC236}">
+                <a16:creationId xmlns:a16="http://schemas.microsoft.com/office/drawing/2014/main" id="{2AA94FA4-F4F6-45D2-94F4-E99D2C750DF1}"/>
+              </a:ext>
+            </a:extLst>
+          </p:cNvPr>
+          <p:cNvSpPr>
+            <a:spLocks noGrp="1"/>
+          </p:cNvSpPr>
+          <p:nvPr>
+            <p:ph type="title"/>
+          </p:nvPr>
+        </p:nvSpPr>
+        <p:spPr/>
+        <p:txBody>
+          <a:bodyPr/>
+          <a:lstStyle/>
+          <a:p>
+            <a:r>
+              <a:rPr lang="en-US" dirty="0"/>
+              <a:t>Four Major Air Pollutants &amp; AQI</a:t>
+            </a:r>
+          </a:p>
+        </p:txBody>
+      </p:sp>
+      <p:sp>
+        <p:nvSpPr>
+          <p:cNvPr id="3" name="Content Placeholder 2">
+            <a:extLst>
+              <a:ext uri="{FF2B5EF4-FFF2-40B4-BE49-F238E27FC236}">
+                <a16:creationId xmlns:a16="http://schemas.microsoft.com/office/drawing/2014/main" id="{D2970F6B-3415-4044-95B5-C0FD3C0B5BB8}"/>
+              </a:ext>
+            </a:extLst>
+          </p:cNvPr>
+          <p:cNvSpPr>
+            <a:spLocks noGrp="1"/>
+          </p:cNvSpPr>
+          <p:nvPr>
+            <p:ph idx="1"/>
+          </p:nvPr>
+        </p:nvSpPr>
+        <p:spPr>
+          <a:xfrm>
+            <a:off x="677334" y="1330079"/>
+            <a:ext cx="8596668" cy="3880773"/>
+          </a:xfrm>
+        </p:spPr>
+        <p:txBody>
+          <a:bodyPr>
+            <a:normAutofit fontScale="85000" lnSpcReduction="20000"/>
+          </a:bodyPr>
+          <a:lstStyle/>
+          <a:p>
+            <a:r>
+              <a:rPr lang="en-US" dirty="0"/>
+              <a:t>Nitrogen Dioxide (NO2)</a:t>
+            </a:r>
+          </a:p>
+          <a:p>
+            <a:pPr lvl="1"/>
+            <a:r>
+              <a:rPr lang="en-US" dirty="0"/>
+              <a:t>Form Ozone and can cause lung irritation</a:t>
+            </a:r>
+          </a:p>
+          <a:p>
+            <a:r>
+              <a:rPr lang="en-US" dirty="0"/>
+              <a:t>Sulphur Dioxide (SO2)</a:t>
+            </a:r>
+          </a:p>
+          <a:p>
+            <a:pPr lvl="1"/>
+            <a:r>
+              <a:rPr lang="en-US" dirty="0"/>
+              <a:t>Product of burning sulfur-containing fuels</a:t>
+            </a:r>
+          </a:p>
+          <a:p>
+            <a:r>
+              <a:rPr lang="en-US" dirty="0"/>
+              <a:t>Carbon Monoxide (CO)</a:t>
+            </a:r>
+          </a:p>
+          <a:p>
+            <a:pPr lvl="1"/>
+            <a:r>
+              <a:rPr lang="en-US" dirty="0"/>
+              <a:t>Formed by the combustion of fossil fuels.  When inhaled, blocks oxygen from the brain, heart, and other vital organs</a:t>
+            </a:r>
+          </a:p>
+          <a:p>
+            <a:r>
+              <a:rPr lang="en-US" dirty="0"/>
+              <a:t>Ozone (O3)</a:t>
+            </a:r>
+          </a:p>
+          <a:p>
+            <a:pPr lvl="1"/>
+            <a:r>
+              <a:rPr lang="en-US" dirty="0"/>
+              <a:t>Main component of smog and is the </a:t>
+            </a:r>
+            <a:r>
+              <a:rPr lang="en-US" b="1" dirty="0">
+                <a:solidFill>
+                  <a:srgbClr val="FF0000"/>
+                </a:solidFill>
+              </a:rPr>
+              <a:t>product of sunlight and emissions from sources such as motor vehicles and industry</a:t>
+            </a:r>
+          </a:p>
+          <a:p>
+            <a:r>
+              <a:rPr lang="en-US" b="1" dirty="0">
+                <a:solidFill>
+                  <a:schemeClr val="tx1"/>
+                </a:solidFill>
+              </a:rPr>
+              <a:t>Air Quality Index (AQI)</a:t>
+            </a:r>
+          </a:p>
+          <a:p>
+            <a:pPr lvl="1"/>
+            <a:r>
+              <a:rPr lang="en-US" dirty="0">
+                <a:solidFill>
+                  <a:schemeClr val="tx1"/>
+                </a:solidFill>
+              </a:rPr>
+              <a:t>The higher the AQI value, the greater the level of air pollution.  </a:t>
+            </a:r>
+          </a:p>
+          <a:p>
+            <a:pPr lvl="1"/>
+            <a:r>
+              <a:rPr lang="en-US" dirty="0">
+                <a:solidFill>
+                  <a:schemeClr val="tx1"/>
+                </a:solidFill>
+              </a:rPr>
+              <a:t>AQI values are generated for each of the major pollutants, and the </a:t>
+            </a:r>
+            <a:r>
+              <a:rPr lang="en-US" b="1" dirty="0">
+                <a:solidFill>
+                  <a:schemeClr val="accent5"/>
+                </a:solidFill>
+              </a:rPr>
+              <a:t>highest</a:t>
+            </a:r>
+            <a:r>
+              <a:rPr lang="en-US" dirty="0">
+                <a:solidFill>
+                  <a:schemeClr val="tx1"/>
+                </a:solidFill>
+              </a:rPr>
+              <a:t> value is reported daily as an indicator of air quality for that day</a:t>
+            </a:r>
+          </a:p>
+        </p:txBody>
+      </p:sp>
+      <p:sp>
+        <p:nvSpPr>
+          <p:cNvPr id="4" name="TextBox 3">
+            <a:extLst>
+              <a:ext uri="{FF2B5EF4-FFF2-40B4-BE49-F238E27FC236}">
+                <a16:creationId xmlns:a16="http://schemas.microsoft.com/office/drawing/2014/main" id="{F2AD386D-CE85-4706-984F-C5DB9B51425A}"/>
+              </a:ext>
+            </a:extLst>
+          </p:cNvPr>
+          <p:cNvSpPr txBox="1"/>
+          <p:nvPr/>
+        </p:nvSpPr>
+        <p:spPr>
+          <a:xfrm>
+            <a:off x="477506" y="6137762"/>
+            <a:ext cx="11236987" cy="646331"/>
+          </a:xfrm>
+          <a:prstGeom prst="rect">
+            <a:avLst/>
+          </a:prstGeom>
+          <a:noFill/>
+        </p:spPr>
+        <p:txBody>
+          <a:bodyPr wrap="none" rtlCol="0">
+            <a:spAutoFit/>
+          </a:bodyPr>
+          <a:lstStyle/>
+          <a:p>
+            <a:r>
+              <a:rPr lang="en-US" dirty="0"/>
+              <a:t>Source: </a:t>
+            </a:r>
+            <a:r>
+              <a:rPr lang="en-US" dirty="0">
+                <a:hlinkClick r:id="rId2"/>
+              </a:rPr>
+              <a:t>https://airnow.gov/index.cfm?action=aqi_brochure.index</a:t>
+            </a:r>
+            <a:endParaRPr lang="en-US" dirty="0"/>
+          </a:p>
+          <a:p>
+            <a:r>
+              <a:rPr lang="en-US" dirty="0">
+                <a:hlinkClick r:id="rId3"/>
+              </a:rPr>
+              <a:t>https://www.ucsusa.org/clean-vehicles/vehicles-air-pollution-and-human-health/cars-trucks-air-pollution</a:t>
+            </a:r>
+            <a:endParaRPr lang="en-US" dirty="0"/>
+          </a:p>
+        </p:txBody>
+      </p:sp>
+    </p:spTree>
+    <p:extLst>
+      <p:ext uri="{BB962C8B-B14F-4D97-AF65-F5344CB8AC3E}">
+        <p14:creationId xmlns:p14="http://schemas.microsoft.com/office/powerpoint/2010/main" val="2333952725"/>
+      </p:ext>
+    </p:extLst>
+  </p:cSld>
+  <p:clrMapOvr>
+    <a:masterClrMapping/>
+  </p:clrMapOvr>
+</p:sld>
+</file>
+
 <file path=ppt/slides/slide2.xml><?xml version="1.0" encoding="utf-8"?>
+<p:sld xmlns:a="http://schemas.openxmlformats.org/drawingml/2006/main" xmlns:r="http://schemas.openxmlformats.org/officeDocument/2006/relationships" xmlns:p="http://schemas.openxmlformats.org/presentationml/2006/main">
+  <p:cSld>
+    <p:spTree>
+      <p:nvGrpSpPr>
+        <p:cNvPr id="1" name=""/>
+        <p:cNvGrpSpPr/>
+        <p:nvPr/>
+      </p:nvGrpSpPr>
+      <p:grpSpPr>
+        <a:xfrm>
+          <a:off x="0" y="0"/>
+          <a:ext cx="0" cy="0"/>
+          <a:chOff x="0" y="0"/>
+          <a:chExt cx="0" cy="0"/>
+        </a:xfrm>
+      </p:grpSpPr>
+      <p:sp>
+        <p:nvSpPr>
+          <p:cNvPr id="2" name="Title 1">
+            <a:extLst>
+              <a:ext uri="{FF2B5EF4-FFF2-40B4-BE49-F238E27FC236}">
+                <a16:creationId xmlns:a16="http://schemas.microsoft.com/office/drawing/2014/main" id="{212A4066-7DA1-4FDB-B5B4-5FCA180CDB3A}"/>
+              </a:ext>
+            </a:extLst>
+          </p:cNvPr>
+          <p:cNvSpPr>
+            <a:spLocks noGrp="1"/>
+          </p:cNvSpPr>
+          <p:nvPr>
+            <p:ph type="title"/>
+          </p:nvPr>
+        </p:nvSpPr>
+        <p:spPr/>
+        <p:txBody>
+          <a:bodyPr/>
+          <a:lstStyle/>
+          <a:p>
+            <a:r>
+              <a:rPr lang="en-US" dirty="0"/>
+              <a:t>Motivation &amp; Summary</a:t>
+            </a:r>
+          </a:p>
+        </p:txBody>
+      </p:sp>
+      <p:sp>
+        <p:nvSpPr>
+          <p:cNvPr id="3" name="Content Placeholder 2">
+            <a:extLst>
+              <a:ext uri="{FF2B5EF4-FFF2-40B4-BE49-F238E27FC236}">
+                <a16:creationId xmlns:a16="http://schemas.microsoft.com/office/drawing/2014/main" id="{CCE29D34-71FB-4891-AE17-F6149F4EECFE}"/>
+              </a:ext>
+            </a:extLst>
+          </p:cNvPr>
+          <p:cNvSpPr>
+            <a:spLocks noGrp="1"/>
+          </p:cNvSpPr>
+          <p:nvPr>
+            <p:ph idx="1"/>
+          </p:nvPr>
+        </p:nvSpPr>
+        <p:spPr/>
+        <p:txBody>
+          <a:bodyPr/>
+          <a:lstStyle/>
+          <a:p>
+            <a:r>
+              <a:rPr lang="en-US" dirty="0"/>
+              <a:t>Historical analysis of Electric Vehicle (EV) Market share</a:t>
+            </a:r>
+          </a:p>
+          <a:p>
+            <a:r>
+              <a:rPr lang="en-US" dirty="0"/>
+              <a:t>With the growth in purchases of electric vehicles, how has air pollution been impacted?</a:t>
+            </a:r>
+          </a:p>
+        </p:txBody>
+      </p:sp>
+    </p:spTree>
+    <p:extLst>
+      <p:ext uri="{BB962C8B-B14F-4D97-AF65-F5344CB8AC3E}">
+        <p14:creationId xmlns:p14="http://schemas.microsoft.com/office/powerpoint/2010/main" val="3205176446"/>
+      </p:ext>
+    </p:extLst>
+  </p:cSld>
+  <p:clrMapOvr>
+    <a:masterClrMapping/>
+  </p:clrMapOvr>
+</p:sld>
+</file>
+
+<file path=ppt/slides/slide20.xml><?xml version="1.0" encoding="utf-8"?>
+<p:sld xmlns:a="http://schemas.openxmlformats.org/drawingml/2006/main" xmlns:r="http://schemas.openxmlformats.org/officeDocument/2006/relationships" xmlns:p="http://schemas.openxmlformats.org/presentationml/2006/main">
+  <p:cSld>
+    <p:spTree>
+      <p:nvGrpSpPr>
+        <p:cNvPr id="1" name=""/>
+        <p:cNvGrpSpPr/>
+        <p:nvPr/>
+      </p:nvGrpSpPr>
+      <p:grpSpPr>
+        <a:xfrm>
+          <a:off x="0" y="0"/>
+          <a:ext cx="0" cy="0"/>
+          <a:chOff x="0" y="0"/>
+          <a:chExt cx="0" cy="0"/>
+        </a:xfrm>
+      </p:grpSpPr>
+      <p:sp>
+        <p:nvSpPr>
+          <p:cNvPr id="2" name="Title 1">
+            <a:extLst>
+              <a:ext uri="{FF2B5EF4-FFF2-40B4-BE49-F238E27FC236}">
+                <a16:creationId xmlns:a16="http://schemas.microsoft.com/office/drawing/2014/main" id="{9C840873-6823-417F-8027-82E07C2753F4}"/>
+              </a:ext>
+            </a:extLst>
+          </p:cNvPr>
+          <p:cNvSpPr>
+            <a:spLocks noGrp="1"/>
+          </p:cNvSpPr>
+          <p:nvPr>
+            <p:ph type="title"/>
+          </p:nvPr>
+        </p:nvSpPr>
+        <p:spPr/>
+        <p:txBody>
+          <a:bodyPr/>
+          <a:lstStyle/>
+          <a:p>
+            <a:r>
+              <a:rPr lang="en-US" dirty="0"/>
+              <a:t>Air Quality Index (AQI) by State &amp; Pollutant</a:t>
+            </a:r>
+          </a:p>
+        </p:txBody>
+      </p:sp>
+      <p:pic>
+        <p:nvPicPr>
+          <p:cNvPr id="4" name="Content Placeholder 3">
+            <a:extLst>
+              <a:ext uri="{FF2B5EF4-FFF2-40B4-BE49-F238E27FC236}">
+                <a16:creationId xmlns:a16="http://schemas.microsoft.com/office/drawing/2014/main" id="{FA1F5858-072E-425D-8533-C307446D32BD}"/>
+              </a:ext>
+            </a:extLst>
+          </p:cNvPr>
+          <p:cNvPicPr>
+            <a:picLocks noGrp="1" noChangeAspect="1"/>
+          </p:cNvPicPr>
+          <p:nvPr>
+            <p:ph idx="1"/>
+          </p:nvPr>
+        </p:nvPicPr>
+        <p:blipFill>
+          <a:blip r:embed="rId2"/>
+          <a:stretch>
+            <a:fillRect/>
+          </a:stretch>
+        </p:blipFill>
+        <p:spPr>
+          <a:xfrm>
+            <a:off x="677334" y="2085975"/>
+            <a:ext cx="4600575" cy="2686050"/>
+          </a:xfrm>
+          <a:prstGeom prst="rect">
+            <a:avLst/>
+          </a:prstGeom>
+        </p:spPr>
+      </p:pic>
+      <p:pic>
+        <p:nvPicPr>
+          <p:cNvPr id="5" name="Picture 4">
+            <a:extLst>
+              <a:ext uri="{FF2B5EF4-FFF2-40B4-BE49-F238E27FC236}">
+                <a16:creationId xmlns:a16="http://schemas.microsoft.com/office/drawing/2014/main" id="{F23F1E55-2A80-4556-8948-3C253977DE84}"/>
+              </a:ext>
+            </a:extLst>
+          </p:cNvPr>
+          <p:cNvPicPr>
+            <a:picLocks noChangeAspect="1"/>
+          </p:cNvPicPr>
+          <p:nvPr/>
+        </p:nvPicPr>
+        <p:blipFill>
+          <a:blip r:embed="rId3"/>
+          <a:stretch>
+            <a:fillRect/>
+          </a:stretch>
+        </p:blipFill>
+        <p:spPr>
+          <a:xfrm>
+            <a:off x="5752182" y="1914525"/>
+            <a:ext cx="6257925" cy="2857500"/>
+          </a:xfrm>
+          <a:prstGeom prst="rect">
+            <a:avLst/>
+          </a:prstGeom>
+        </p:spPr>
+      </p:pic>
+      <p:sp>
+        <p:nvSpPr>
+          <p:cNvPr id="6" name="TextBox 5">
+            <a:extLst>
+              <a:ext uri="{FF2B5EF4-FFF2-40B4-BE49-F238E27FC236}">
+                <a16:creationId xmlns:a16="http://schemas.microsoft.com/office/drawing/2014/main" id="{09686A58-8900-4A75-A276-34F8FC99885E}"/>
+              </a:ext>
+            </a:extLst>
+          </p:cNvPr>
+          <p:cNvSpPr txBox="1"/>
+          <p:nvPr/>
+        </p:nvSpPr>
+        <p:spPr>
+          <a:xfrm>
+            <a:off x="2106400" y="6488668"/>
+            <a:ext cx="6343018" cy="369332"/>
+          </a:xfrm>
+          <a:prstGeom prst="rect">
+            <a:avLst/>
+          </a:prstGeom>
+          <a:noFill/>
+        </p:spPr>
+        <p:txBody>
+          <a:bodyPr wrap="none" rtlCol="0">
+            <a:spAutoFit/>
+          </a:bodyPr>
+          <a:lstStyle/>
+          <a:p>
+            <a:r>
+              <a:rPr lang="en-US" dirty="0"/>
+              <a:t>Source: </a:t>
+            </a:r>
+            <a:r>
+              <a:rPr lang="en-US" dirty="0">
+                <a:hlinkClick r:id="rId4"/>
+              </a:rPr>
+              <a:t>https://airnow.gov/index.cfm?action=aqibasics.aqi</a:t>
+            </a:r>
+            <a:endParaRPr lang="en-US" dirty="0"/>
+          </a:p>
+        </p:txBody>
+      </p:sp>
+    </p:spTree>
+    <p:extLst>
+      <p:ext uri="{BB962C8B-B14F-4D97-AF65-F5344CB8AC3E}">
+        <p14:creationId xmlns:p14="http://schemas.microsoft.com/office/powerpoint/2010/main" val="3634847899"/>
+      </p:ext>
+    </p:extLst>
+  </p:cSld>
+  <p:clrMapOvr>
+    <a:masterClrMapping/>
+  </p:clrMapOvr>
+</p:sld>
+</file>
+
+<file path=ppt/slides/slide21.xml><?xml version="1.0" encoding="utf-8"?>
+<p:sld xmlns:a="http://schemas.openxmlformats.org/drawingml/2006/main" xmlns:r="http://schemas.openxmlformats.org/officeDocument/2006/relationships" xmlns:p="http://schemas.openxmlformats.org/presentationml/2006/main">
+  <p:cSld>
+    <p:spTree>
+      <p:nvGrpSpPr>
+        <p:cNvPr id="1" name=""/>
+        <p:cNvGrpSpPr/>
+        <p:nvPr/>
+      </p:nvGrpSpPr>
+      <p:grpSpPr>
+        <a:xfrm>
+          <a:off x="0" y="0"/>
+          <a:ext cx="0" cy="0"/>
+          <a:chOff x="0" y="0"/>
+          <a:chExt cx="0" cy="0"/>
+        </a:xfrm>
+      </p:grpSpPr>
+      <p:sp>
+        <p:nvSpPr>
+          <p:cNvPr id="2" name="Title 1">
+            <a:extLst>
+              <a:ext uri="{FF2B5EF4-FFF2-40B4-BE49-F238E27FC236}">
+                <a16:creationId xmlns:a16="http://schemas.microsoft.com/office/drawing/2014/main" id="{599269E5-ADAE-472B-8B69-54E5F2A22A40}"/>
+              </a:ext>
+            </a:extLst>
+          </p:cNvPr>
+          <p:cNvSpPr>
+            <a:spLocks noGrp="1"/>
+          </p:cNvSpPr>
+          <p:nvPr>
+            <p:ph type="title"/>
+          </p:nvPr>
+        </p:nvSpPr>
+        <p:spPr/>
+        <p:txBody>
+          <a:bodyPr/>
+          <a:lstStyle/>
+          <a:p>
+            <a:r>
+              <a:rPr lang="en-US" dirty="0"/>
+              <a:t>Findings</a:t>
+            </a:r>
+          </a:p>
+        </p:txBody>
+      </p:sp>
+      <p:pic>
+        <p:nvPicPr>
+          <p:cNvPr id="5" name="Picture 4">
+            <a:extLst>
+              <a:ext uri="{FF2B5EF4-FFF2-40B4-BE49-F238E27FC236}">
+                <a16:creationId xmlns:a16="http://schemas.microsoft.com/office/drawing/2014/main" id="{C65D030C-8A4B-40AF-964B-61B493471E2F}"/>
+              </a:ext>
+            </a:extLst>
+          </p:cNvPr>
+          <p:cNvPicPr>
+            <a:picLocks noChangeAspect="1"/>
+          </p:cNvPicPr>
+          <p:nvPr/>
+        </p:nvPicPr>
+        <p:blipFill>
+          <a:blip r:embed="rId2"/>
+          <a:stretch>
+            <a:fillRect/>
+          </a:stretch>
+        </p:blipFill>
+        <p:spPr>
+          <a:xfrm>
+            <a:off x="677334" y="1201722"/>
+            <a:ext cx="4114800" cy="2743200"/>
+          </a:xfrm>
+          <a:prstGeom prst="rect">
+            <a:avLst/>
+          </a:prstGeom>
+          <a:ln>
+            <a:noFill/>
+          </a:ln>
+        </p:spPr>
+      </p:pic>
+      <p:pic>
+        <p:nvPicPr>
+          <p:cNvPr id="7" name="Picture 6">
+            <a:extLst>
+              <a:ext uri="{FF2B5EF4-FFF2-40B4-BE49-F238E27FC236}">
+                <a16:creationId xmlns:a16="http://schemas.microsoft.com/office/drawing/2014/main" id="{9A28F3F0-8CAC-4739-BC46-9007D09539F1}"/>
+              </a:ext>
+            </a:extLst>
+          </p:cNvPr>
+          <p:cNvPicPr>
+            <a:picLocks noChangeAspect="1"/>
+          </p:cNvPicPr>
+          <p:nvPr/>
+        </p:nvPicPr>
+        <p:blipFill>
+          <a:blip r:embed="rId3"/>
+          <a:stretch>
+            <a:fillRect/>
+          </a:stretch>
+        </p:blipFill>
+        <p:spPr>
+          <a:xfrm>
+            <a:off x="5159202" y="1201722"/>
+            <a:ext cx="4114800" cy="2743200"/>
+          </a:xfrm>
+          <a:prstGeom prst="rect">
+            <a:avLst/>
+          </a:prstGeom>
+        </p:spPr>
+      </p:pic>
+      <p:pic>
+        <p:nvPicPr>
+          <p:cNvPr id="9" name="Picture 8">
+            <a:extLst>
+              <a:ext uri="{FF2B5EF4-FFF2-40B4-BE49-F238E27FC236}">
+                <a16:creationId xmlns:a16="http://schemas.microsoft.com/office/drawing/2014/main" id="{6500BEDD-B836-40C3-A39B-36912BEC9CE3}"/>
+              </a:ext>
+            </a:extLst>
+          </p:cNvPr>
+          <p:cNvPicPr>
+            <a:picLocks noChangeAspect="1"/>
+          </p:cNvPicPr>
+          <p:nvPr/>
+        </p:nvPicPr>
+        <p:blipFill>
+          <a:blip r:embed="rId4"/>
+          <a:stretch>
+            <a:fillRect/>
+          </a:stretch>
+        </p:blipFill>
+        <p:spPr>
+          <a:xfrm>
+            <a:off x="677334" y="3760365"/>
+            <a:ext cx="4114800" cy="2743200"/>
+          </a:xfrm>
+          <a:prstGeom prst="rect">
+            <a:avLst/>
+          </a:prstGeom>
+        </p:spPr>
+      </p:pic>
+      <p:pic>
+        <p:nvPicPr>
+          <p:cNvPr id="11" name="Picture 10">
+            <a:extLst>
+              <a:ext uri="{FF2B5EF4-FFF2-40B4-BE49-F238E27FC236}">
+                <a16:creationId xmlns:a16="http://schemas.microsoft.com/office/drawing/2014/main" id="{0B50C005-2AF4-40CA-A437-F3061239AC29}"/>
+              </a:ext>
+            </a:extLst>
+          </p:cNvPr>
+          <p:cNvPicPr>
+            <a:picLocks noChangeAspect="1"/>
+          </p:cNvPicPr>
+          <p:nvPr/>
+        </p:nvPicPr>
+        <p:blipFill>
+          <a:blip r:embed="rId5"/>
+          <a:stretch>
+            <a:fillRect/>
+          </a:stretch>
+        </p:blipFill>
+        <p:spPr>
+          <a:xfrm>
+            <a:off x="5159202" y="3760365"/>
+            <a:ext cx="4114800" cy="2743200"/>
+          </a:xfrm>
+          <a:prstGeom prst="rect">
+            <a:avLst/>
+          </a:prstGeom>
+        </p:spPr>
+      </p:pic>
+      <p:sp>
+        <p:nvSpPr>
+          <p:cNvPr id="12" name="Rectangle 11">
+            <a:extLst>
+              <a:ext uri="{FF2B5EF4-FFF2-40B4-BE49-F238E27FC236}">
+                <a16:creationId xmlns:a16="http://schemas.microsoft.com/office/drawing/2014/main" id="{5EA9D497-A5BF-42AD-B3A0-16E933F3A116}"/>
+              </a:ext>
+            </a:extLst>
+          </p:cNvPr>
+          <p:cNvSpPr/>
+          <p:nvPr/>
+        </p:nvSpPr>
+        <p:spPr>
+          <a:xfrm>
+            <a:off x="677334" y="1201722"/>
+            <a:ext cx="4114800" cy="2472656"/>
+          </a:xfrm>
+          <a:prstGeom prst="rect">
+            <a:avLst/>
+          </a:prstGeom>
+          <a:noFill/>
+          <a:ln>
+            <a:solidFill>
+              <a:srgbClr val="FF0000"/>
+            </a:solidFill>
+          </a:ln>
+        </p:spPr>
+        <p:style>
+          <a:lnRef idx="2">
+            <a:schemeClr val="accent1">
+              <a:shade val="50000"/>
+            </a:schemeClr>
+          </a:lnRef>
+          <a:fillRef idx="1">
+            <a:schemeClr val="accent1"/>
+          </a:fillRef>
+          <a:effectRef idx="0">
+            <a:schemeClr val="accent1"/>
+          </a:effectRef>
+          <a:fontRef idx="minor">
+            <a:schemeClr val="lt1"/>
+          </a:fontRef>
+        </p:style>
+        <p:txBody>
+          <a:bodyPr rtlCol="0" anchor="ctr"/>
+          <a:lstStyle/>
+          <a:p>
+            <a:pPr algn="ctr"/>
+            <a:endParaRPr lang="en-US"/>
+          </a:p>
+        </p:txBody>
+      </p:sp>
+      <p:pic>
+        <p:nvPicPr>
+          <p:cNvPr id="13" name="Picture 12">
+            <a:extLst>
+              <a:ext uri="{FF2B5EF4-FFF2-40B4-BE49-F238E27FC236}">
+                <a16:creationId xmlns:a16="http://schemas.microsoft.com/office/drawing/2014/main" id="{3BB6A836-9C14-4989-B119-EF6D6A597B65}"/>
+              </a:ext>
+            </a:extLst>
+          </p:cNvPr>
+          <p:cNvPicPr>
+            <a:picLocks noChangeAspect="1"/>
+          </p:cNvPicPr>
+          <p:nvPr/>
+        </p:nvPicPr>
+        <p:blipFill>
+          <a:blip r:embed="rId6"/>
+          <a:stretch>
+            <a:fillRect/>
+          </a:stretch>
+        </p:blipFill>
+        <p:spPr>
+          <a:xfrm>
+            <a:off x="8525086" y="0"/>
+            <a:ext cx="3666914" cy="1674390"/>
+          </a:xfrm>
+          <a:prstGeom prst="rect">
+            <a:avLst/>
+          </a:prstGeom>
+        </p:spPr>
+      </p:pic>
+    </p:spTree>
+    <p:extLst>
+      <p:ext uri="{BB962C8B-B14F-4D97-AF65-F5344CB8AC3E}">
+        <p14:creationId xmlns:p14="http://schemas.microsoft.com/office/powerpoint/2010/main" val="1562297322"/>
+      </p:ext>
+    </p:extLst>
+  </p:cSld>
+  <p:clrMapOvr>
+    <a:masterClrMapping/>
+  </p:clrMapOvr>
+</p:sld>
+</file>
+
+<file path=ppt/slides/slide22.xml><?xml version="1.0" encoding="utf-8"?>
+<p:sld xmlns:a="http://schemas.openxmlformats.org/drawingml/2006/main" xmlns:r="http://schemas.openxmlformats.org/officeDocument/2006/relationships" xmlns:p="http://schemas.openxmlformats.org/presentationml/2006/main">
+  <p:cSld>
+    <p:spTree>
+      <p:nvGrpSpPr>
+        <p:cNvPr id="1" name=""/>
+        <p:cNvGrpSpPr/>
+        <p:nvPr/>
+      </p:nvGrpSpPr>
+      <p:grpSpPr>
+        <a:xfrm>
+          <a:off x="0" y="0"/>
+          <a:ext cx="0" cy="0"/>
+          <a:chOff x="0" y="0"/>
+          <a:chExt cx="0" cy="0"/>
+        </a:xfrm>
+      </p:grpSpPr>
+      <p:sp>
+        <p:nvSpPr>
+          <p:cNvPr id="2" name="Title 1">
+            <a:extLst>
+              <a:ext uri="{FF2B5EF4-FFF2-40B4-BE49-F238E27FC236}">
+                <a16:creationId xmlns:a16="http://schemas.microsoft.com/office/drawing/2014/main" id="{5FF0B3A1-1C18-4E15-8302-ECB3385F1CA4}"/>
+              </a:ext>
+            </a:extLst>
+          </p:cNvPr>
+          <p:cNvSpPr>
+            <a:spLocks noGrp="1"/>
+          </p:cNvSpPr>
+          <p:nvPr>
+            <p:ph type="title"/>
+          </p:nvPr>
+        </p:nvSpPr>
+        <p:spPr/>
+        <p:txBody>
+          <a:bodyPr/>
+          <a:lstStyle/>
+          <a:p>
+            <a:r>
+              <a:rPr lang="en-US" dirty="0"/>
+              <a:t>US Vehicle-Miles Trend</a:t>
+            </a:r>
+          </a:p>
+        </p:txBody>
+      </p:sp>
+      <p:pic>
+        <p:nvPicPr>
+          <p:cNvPr id="5" name="Content Placeholder 4">
+            <a:extLst>
+              <a:ext uri="{FF2B5EF4-FFF2-40B4-BE49-F238E27FC236}">
+                <a16:creationId xmlns:a16="http://schemas.microsoft.com/office/drawing/2014/main" id="{783DE995-2505-4458-AD4D-959BE65A5247}"/>
+              </a:ext>
+            </a:extLst>
+          </p:cNvPr>
+          <p:cNvPicPr>
+            <a:picLocks noGrp="1" noChangeAspect="1"/>
+          </p:cNvPicPr>
+          <p:nvPr>
+            <p:ph idx="1"/>
+          </p:nvPr>
+        </p:nvPicPr>
+        <p:blipFill>
+          <a:blip r:embed="rId2"/>
+          <a:stretch>
+            <a:fillRect/>
+          </a:stretch>
+        </p:blipFill>
+        <p:spPr>
+          <a:xfrm>
+            <a:off x="608350" y="1846510"/>
+            <a:ext cx="5487650" cy="3658433"/>
+          </a:xfrm>
+        </p:spPr>
+      </p:pic>
+      <p:sp>
+        <p:nvSpPr>
+          <p:cNvPr id="6" name="TextBox 5">
+            <a:extLst>
+              <a:ext uri="{FF2B5EF4-FFF2-40B4-BE49-F238E27FC236}">
+                <a16:creationId xmlns:a16="http://schemas.microsoft.com/office/drawing/2014/main" id="{23BF74BE-A3F2-4935-A3C3-70A60DEC502A}"/>
+              </a:ext>
+            </a:extLst>
+          </p:cNvPr>
+          <p:cNvSpPr txBox="1"/>
+          <p:nvPr/>
+        </p:nvSpPr>
+        <p:spPr>
+          <a:xfrm>
+            <a:off x="5645791" y="2106065"/>
+            <a:ext cx="4362275" cy="3416320"/>
+          </a:xfrm>
+          <a:prstGeom prst="rect">
+            <a:avLst/>
+          </a:prstGeom>
+          <a:noFill/>
+        </p:spPr>
+        <p:txBody>
+          <a:bodyPr wrap="square" rtlCol="0">
+            <a:spAutoFit/>
+          </a:bodyPr>
+          <a:lstStyle/>
+          <a:p>
+            <a:pPr marL="285750" indent="-285750">
+              <a:buFont typeface="Arial" panose="020B0604020202020204" pitchFamily="34" charset="0"/>
+              <a:buChar char="•"/>
+            </a:pPr>
+            <a:r>
+              <a:rPr lang="en-US" dirty="0"/>
+              <a:t>Miles traveled via ground vehicles (highway) within the US has increased steadily since 2000</a:t>
+            </a:r>
+          </a:p>
+          <a:p>
+            <a:pPr marL="285750" indent="-285750">
+              <a:buFont typeface="Arial" panose="020B0604020202020204" pitchFamily="34" charset="0"/>
+              <a:buChar char="•"/>
+            </a:pPr>
+            <a:r>
+              <a:rPr lang="en-US" dirty="0"/>
+              <a:t>This indicates a negative correlation between air pollution levels and vehicle miles traveled – </a:t>
+            </a:r>
+            <a:r>
+              <a:rPr lang="en-US" b="1" dirty="0"/>
+              <a:t>does this make sense?</a:t>
+            </a:r>
+          </a:p>
+          <a:p>
+            <a:pPr marL="285750" indent="-285750">
+              <a:buFont typeface="Arial" panose="020B0604020202020204" pitchFamily="34" charset="0"/>
+              <a:buChar char="•"/>
+            </a:pPr>
+            <a:r>
+              <a:rPr lang="en-US" dirty="0"/>
+              <a:t>Based off this analysis, our next inference would be that the growth of Hybrid/EV sales is dropping pollution levels despite a growth in miles traveled via ground vehicles</a:t>
+            </a:r>
+          </a:p>
+        </p:txBody>
+      </p:sp>
+      <p:sp>
+        <p:nvSpPr>
+          <p:cNvPr id="7" name="TextBox 6">
+            <a:extLst>
+              <a:ext uri="{FF2B5EF4-FFF2-40B4-BE49-F238E27FC236}">
+                <a16:creationId xmlns:a16="http://schemas.microsoft.com/office/drawing/2014/main" id="{6861BBBF-99E1-4A2C-993F-A01F02DA527F}"/>
+              </a:ext>
+            </a:extLst>
+          </p:cNvPr>
+          <p:cNvSpPr txBox="1"/>
+          <p:nvPr/>
+        </p:nvSpPr>
+        <p:spPr>
+          <a:xfrm>
+            <a:off x="2038525" y="6372521"/>
+            <a:ext cx="6460038" cy="369332"/>
+          </a:xfrm>
+          <a:prstGeom prst="rect">
+            <a:avLst/>
+          </a:prstGeom>
+          <a:noFill/>
+        </p:spPr>
+        <p:txBody>
+          <a:bodyPr wrap="none" rtlCol="0">
+            <a:spAutoFit/>
+          </a:bodyPr>
+          <a:lstStyle/>
+          <a:p>
+            <a:r>
+              <a:rPr lang="en-US" dirty="0"/>
+              <a:t>Data source: </a:t>
+            </a:r>
+            <a:r>
+              <a:rPr lang="en-US" dirty="0">
+                <a:hlinkClick r:id="rId3"/>
+              </a:rPr>
+              <a:t>https://www.bts.gov/content/us-vehicle-miles</a:t>
+            </a:r>
+            <a:endParaRPr lang="en-US" dirty="0"/>
+          </a:p>
+        </p:txBody>
+      </p:sp>
+    </p:spTree>
+    <p:extLst>
+      <p:ext uri="{BB962C8B-B14F-4D97-AF65-F5344CB8AC3E}">
+        <p14:creationId xmlns:p14="http://schemas.microsoft.com/office/powerpoint/2010/main" val="626922327"/>
+      </p:ext>
+    </p:extLst>
+  </p:cSld>
+  <p:clrMapOvr>
+    <a:masterClrMapping/>
+  </p:clrMapOvr>
+</p:sld>
+</file>
+
+<file path=ppt/slides/slide23.xml><?xml version="1.0" encoding="utf-8"?>
+<p:sld xmlns:a="http://schemas.openxmlformats.org/drawingml/2006/main" xmlns:r="http://schemas.openxmlformats.org/officeDocument/2006/relationships" xmlns:p="http://schemas.openxmlformats.org/presentationml/2006/main">
+  <p:cSld>
+    <p:spTree>
+      <p:nvGrpSpPr>
+        <p:cNvPr id="1" name=""/>
+        <p:cNvGrpSpPr/>
+        <p:nvPr/>
+      </p:nvGrpSpPr>
+      <p:grpSpPr>
+        <a:xfrm>
+          <a:off x="0" y="0"/>
+          <a:ext cx="0" cy="0"/>
+          <a:chOff x="0" y="0"/>
+          <a:chExt cx="0" cy="0"/>
+        </a:xfrm>
+      </p:grpSpPr>
+      <p:sp>
+        <p:nvSpPr>
+          <p:cNvPr id="2" name="Title 1">
+            <a:extLst>
+              <a:ext uri="{FF2B5EF4-FFF2-40B4-BE49-F238E27FC236}">
+                <a16:creationId xmlns:a16="http://schemas.microsoft.com/office/drawing/2014/main" id="{AC746231-4583-4AC7-A701-EFC099707208}"/>
+              </a:ext>
+            </a:extLst>
+          </p:cNvPr>
+          <p:cNvSpPr>
+            <a:spLocks noGrp="1"/>
+          </p:cNvSpPr>
+          <p:nvPr>
+            <p:ph type="title"/>
+          </p:nvPr>
+        </p:nvSpPr>
+        <p:spPr/>
+        <p:txBody>
+          <a:bodyPr/>
+          <a:lstStyle/>
+          <a:p>
+            <a:r>
+              <a:rPr lang="en-US" dirty="0"/>
+              <a:t>Post Mortem</a:t>
+            </a:r>
+          </a:p>
+        </p:txBody>
+      </p:sp>
+      <p:sp>
+        <p:nvSpPr>
+          <p:cNvPr id="3" name="Content Placeholder 2">
+            <a:extLst>
+              <a:ext uri="{FF2B5EF4-FFF2-40B4-BE49-F238E27FC236}">
+                <a16:creationId xmlns:a16="http://schemas.microsoft.com/office/drawing/2014/main" id="{8D4C4395-BB2E-44B8-AC8F-6D82FF144DF8}"/>
+              </a:ext>
+            </a:extLst>
+          </p:cNvPr>
+          <p:cNvSpPr>
+            <a:spLocks noGrp="1"/>
+          </p:cNvSpPr>
+          <p:nvPr>
+            <p:ph idx="1"/>
+          </p:nvPr>
+        </p:nvSpPr>
+        <p:spPr/>
+        <p:txBody>
+          <a:bodyPr/>
+          <a:lstStyle/>
+          <a:p>
+            <a:endParaRPr lang="en-US"/>
+          </a:p>
+        </p:txBody>
+      </p:sp>
+    </p:spTree>
+    <p:extLst>
+      <p:ext uri="{BB962C8B-B14F-4D97-AF65-F5344CB8AC3E}">
+        <p14:creationId xmlns:p14="http://schemas.microsoft.com/office/powerpoint/2010/main" val="1002952025"/>
+      </p:ext>
+    </p:extLst>
+  </p:cSld>
+  <p:clrMapOvr>
+    <a:masterClrMapping/>
+  </p:clrMapOvr>
+</p:sld>
+</file>
+
+<file path=ppt/slides/slide24.xml><?xml version="1.0" encoding="utf-8"?>
+<p:sld xmlns:a="http://schemas.openxmlformats.org/drawingml/2006/main" xmlns:r="http://schemas.openxmlformats.org/officeDocument/2006/relationships" xmlns:p="http://schemas.openxmlformats.org/presentationml/2006/main">
+  <p:cSld>
+    <p:spTree>
+      <p:nvGrpSpPr>
+        <p:cNvPr id="1" name=""/>
+        <p:cNvGrpSpPr/>
+        <p:nvPr/>
+      </p:nvGrpSpPr>
+      <p:grpSpPr>
+        <a:xfrm>
+          <a:off x="0" y="0"/>
+          <a:ext cx="0" cy="0"/>
+          <a:chOff x="0" y="0"/>
+          <a:chExt cx="0" cy="0"/>
+        </a:xfrm>
+      </p:grpSpPr>
+      <p:sp>
+        <p:nvSpPr>
+          <p:cNvPr id="2" name="Title 1">
+            <a:extLst>
+              <a:ext uri="{FF2B5EF4-FFF2-40B4-BE49-F238E27FC236}">
+                <a16:creationId xmlns:a16="http://schemas.microsoft.com/office/drawing/2014/main" id="{334242BA-58D2-468F-A973-6EA5A69E653A}"/>
+              </a:ext>
+            </a:extLst>
+          </p:cNvPr>
+          <p:cNvSpPr>
+            <a:spLocks noGrp="1"/>
+          </p:cNvSpPr>
+          <p:nvPr>
+            <p:ph type="ctrTitle"/>
+          </p:nvPr>
+        </p:nvSpPr>
+        <p:spPr/>
+        <p:txBody>
+          <a:bodyPr/>
+          <a:lstStyle/>
+          <a:p>
+            <a:r>
+              <a:rPr lang="en-US" dirty="0"/>
+              <a:t>Q&amp;A</a:t>
+            </a:r>
+          </a:p>
+        </p:txBody>
+      </p:sp>
+    </p:spTree>
+    <p:extLst>
+      <p:ext uri="{BB962C8B-B14F-4D97-AF65-F5344CB8AC3E}">
+        <p14:creationId xmlns:p14="http://schemas.microsoft.com/office/powerpoint/2010/main" val="872807738"/>
+      </p:ext>
+    </p:extLst>
+  </p:cSld>
+  <p:clrMapOvr>
+    <a:masterClrMapping/>
+  </p:clrMapOvr>
+</p:sld>
+</file>
+
+<file path=ppt/slides/slide3.xml><?xml version="1.0" encoding="utf-8"?>
+<p:sld xmlns:a="http://schemas.openxmlformats.org/drawingml/2006/main" xmlns:r="http://schemas.openxmlformats.org/officeDocument/2006/relationships" xmlns:p="http://schemas.openxmlformats.org/presentationml/2006/main">
+  <p:cSld>
+    <p:spTree>
+      <p:nvGrpSpPr>
+        <p:cNvPr id="1" name=""/>
+        <p:cNvGrpSpPr/>
+        <p:nvPr/>
+      </p:nvGrpSpPr>
+      <p:grpSpPr>
+        <a:xfrm>
+          <a:off x="0" y="0"/>
+          <a:ext cx="0" cy="0"/>
+          <a:chOff x="0" y="0"/>
+          <a:chExt cx="0" cy="0"/>
+        </a:xfrm>
+      </p:grpSpPr>
+      <p:sp>
+        <p:nvSpPr>
+          <p:cNvPr id="2" name="Title 1">
+            <a:extLst>
+              <a:ext uri="{FF2B5EF4-FFF2-40B4-BE49-F238E27FC236}">
+                <a16:creationId xmlns:a16="http://schemas.microsoft.com/office/drawing/2014/main" id="{EAD63432-2154-4C58-A66A-E16DC15663A2}"/>
+              </a:ext>
+            </a:extLst>
+          </p:cNvPr>
+          <p:cNvSpPr>
+            <a:spLocks noGrp="1"/>
+          </p:cNvSpPr>
+          <p:nvPr>
+            <p:ph type="title"/>
+          </p:nvPr>
+        </p:nvSpPr>
+        <p:spPr/>
+        <p:txBody>
+          <a:bodyPr/>
+          <a:lstStyle/>
+          <a:p>
+            <a:r>
+              <a:rPr lang="en-US" dirty="0"/>
+              <a:t>Questions &amp; Data</a:t>
+            </a:r>
+          </a:p>
+        </p:txBody>
+      </p:sp>
+      <p:sp>
+        <p:nvSpPr>
+          <p:cNvPr id="3" name="Content Placeholder 2">
+            <a:extLst>
+              <a:ext uri="{FF2B5EF4-FFF2-40B4-BE49-F238E27FC236}">
+                <a16:creationId xmlns:a16="http://schemas.microsoft.com/office/drawing/2014/main" id="{70D8A547-BA4D-4C0F-A46B-7499FE4AF5CD}"/>
+              </a:ext>
+            </a:extLst>
+          </p:cNvPr>
+          <p:cNvSpPr>
+            <a:spLocks noGrp="1"/>
+          </p:cNvSpPr>
+          <p:nvPr>
+            <p:ph idx="1"/>
+          </p:nvPr>
+        </p:nvSpPr>
+        <p:spPr/>
+        <p:txBody>
+          <a:bodyPr/>
+          <a:lstStyle/>
+          <a:p>
+            <a:r>
+              <a:rPr lang="en-US" dirty="0"/>
+              <a:t>Historical analysis of Electric Vehicle (EV) Market share</a:t>
+            </a:r>
+          </a:p>
+          <a:p>
+            <a:r>
+              <a:rPr lang="en-US" dirty="0"/>
+              <a:t>With the growth in purchases of electric vehicles, how has air pollution been impacted?</a:t>
+            </a:r>
+          </a:p>
+          <a:p>
+            <a:endParaRPr lang="en-US" dirty="0"/>
+          </a:p>
+          <a:p>
+            <a:r>
+              <a:rPr lang="en-US" dirty="0"/>
+              <a:t>Data sourced from Kaggle “U.S. Pollution Data” (</a:t>
+            </a:r>
+            <a:r>
+              <a:rPr lang="en-US" dirty="0">
+                <a:hlinkClick r:id="rId2"/>
+              </a:rPr>
+              <a:t>https://www.kaggle.com/sogun3/uspollution/version/1</a:t>
+            </a:r>
+            <a:r>
+              <a:rPr lang="en-US" dirty="0"/>
+              <a:t>)</a:t>
+            </a:r>
+          </a:p>
+          <a:p>
+            <a:endParaRPr lang="en-US" dirty="0"/>
+          </a:p>
+          <a:p>
+            <a:endParaRPr lang="en-US" dirty="0"/>
+          </a:p>
+        </p:txBody>
+      </p:sp>
+    </p:spTree>
+    <p:extLst>
+      <p:ext uri="{BB962C8B-B14F-4D97-AF65-F5344CB8AC3E}">
+        <p14:creationId xmlns:p14="http://schemas.microsoft.com/office/powerpoint/2010/main" val="1180815208"/>
+      </p:ext>
+    </p:extLst>
+  </p:cSld>
+  <p:clrMapOvr>
+    <a:masterClrMapping/>
+  </p:clrMapOvr>
+</p:sld>
+</file>
+
+<file path=ppt/slides/slide4.xml><?xml version="1.0" encoding="utf-8"?>
+<p:sld xmlns:a="http://schemas.openxmlformats.org/drawingml/2006/main" xmlns:r="http://schemas.openxmlformats.org/officeDocument/2006/relationships" xmlns:p="http://schemas.openxmlformats.org/presentationml/2006/main">
+  <p:cSld>
+    <p:spTree>
+      <p:nvGrpSpPr>
+        <p:cNvPr id="1" name=""/>
+        <p:cNvGrpSpPr/>
+        <p:nvPr/>
+      </p:nvGrpSpPr>
+      <p:grpSpPr>
+        <a:xfrm>
+          <a:off x="0" y="0"/>
+          <a:ext cx="0" cy="0"/>
+          <a:chOff x="0" y="0"/>
+          <a:chExt cx="0" cy="0"/>
+        </a:xfrm>
+      </p:grpSpPr>
+      <p:sp>
+        <p:nvSpPr>
+          <p:cNvPr id="2" name="Title 1">
+            <a:extLst>
+              <a:ext uri="{FF2B5EF4-FFF2-40B4-BE49-F238E27FC236}">
+                <a16:creationId xmlns:a16="http://schemas.microsoft.com/office/drawing/2014/main" id="{5E0CDF61-D443-46B4-8853-6216FBEBC082}"/>
+              </a:ext>
+            </a:extLst>
+          </p:cNvPr>
+          <p:cNvSpPr>
+            <a:spLocks noGrp="1"/>
+          </p:cNvSpPr>
+          <p:nvPr>
+            <p:ph type="title"/>
+          </p:nvPr>
+        </p:nvSpPr>
+        <p:spPr/>
+        <p:txBody>
+          <a:bodyPr/>
+          <a:lstStyle/>
+          <a:p>
+            <a:r>
+              <a:rPr lang="en-US" dirty="0"/>
+              <a:t>Data Cleanup &amp; Exploration</a:t>
+            </a:r>
+          </a:p>
+        </p:txBody>
+      </p:sp>
+      <p:sp>
+        <p:nvSpPr>
+          <p:cNvPr id="3" name="Content Placeholder 2">
+            <a:extLst>
+              <a:ext uri="{FF2B5EF4-FFF2-40B4-BE49-F238E27FC236}">
+                <a16:creationId xmlns:a16="http://schemas.microsoft.com/office/drawing/2014/main" id="{BDECCC88-8DF0-4508-9084-6EB00371806F}"/>
+              </a:ext>
+            </a:extLst>
+          </p:cNvPr>
+          <p:cNvSpPr>
+            <a:spLocks noGrp="1"/>
+          </p:cNvSpPr>
+          <p:nvPr>
+            <p:ph idx="1"/>
+          </p:nvPr>
+        </p:nvSpPr>
+        <p:spPr>
+          <a:xfrm>
+            <a:off x="677334" y="1488613"/>
+            <a:ext cx="8596668" cy="3880773"/>
+          </a:xfrm>
+        </p:spPr>
+        <p:txBody>
+          <a:bodyPr/>
+          <a:lstStyle/>
+          <a:p>
+            <a:r>
+              <a:rPr lang="en-US" dirty="0"/>
+              <a:t>Read csv into a pandas </a:t>
+            </a:r>
+            <a:r>
+              <a:rPr lang="en-US" dirty="0" err="1"/>
+              <a:t>DataFrame</a:t>
+            </a:r>
+            <a:endParaRPr lang="en-US" dirty="0"/>
+          </a:p>
+          <a:p>
+            <a:r>
+              <a:rPr lang="en-US" dirty="0"/>
+              <a:t>Get rid of unnecessary data</a:t>
+            </a:r>
+          </a:p>
+          <a:p>
+            <a:r>
+              <a:rPr lang="en-US" dirty="0"/>
+              <a:t>Handle multiple records for same day (measured in morning and afternoon)</a:t>
+            </a:r>
+          </a:p>
+          <a:p>
+            <a:r>
+              <a:rPr lang="en-US" dirty="0"/>
+              <a:t>Separate data by Year, and return max AQI value for each pollutant by Year</a:t>
+            </a:r>
+          </a:p>
+          <a:p>
+            <a:r>
+              <a:rPr lang="en-US" dirty="0"/>
+              <a:t>Using </a:t>
+            </a:r>
+            <a:r>
+              <a:rPr lang="en-US" dirty="0" err="1"/>
+              <a:t>Cartopy</a:t>
+            </a:r>
+            <a:r>
+              <a:rPr lang="en-US" dirty="0"/>
+              <a:t>, create a US Map Figure while color coding shape based on AQI value for a given year</a:t>
+            </a:r>
+          </a:p>
+          <a:p>
+            <a:r>
+              <a:rPr lang="en-US" dirty="0"/>
+              <a:t>Using matplotlib, leverage </a:t>
+            </a:r>
+            <a:r>
+              <a:rPr lang="en-US" dirty="0" err="1"/>
+              <a:t>FuncAnimation</a:t>
+            </a:r>
+            <a:r>
+              <a:rPr lang="en-US" dirty="0"/>
+              <a:t> to create animation that shows Max AQI values for each year from 2000-2016</a:t>
+            </a:r>
+          </a:p>
+          <a:p>
+            <a:r>
+              <a:rPr lang="en-US" dirty="0"/>
+              <a:t>Repeat for each air pollutant</a:t>
+            </a:r>
+          </a:p>
+          <a:p>
+            <a:endParaRPr lang="en-US" dirty="0"/>
+          </a:p>
+        </p:txBody>
+      </p:sp>
+    </p:spTree>
+    <p:extLst>
+      <p:ext uri="{BB962C8B-B14F-4D97-AF65-F5344CB8AC3E}">
+        <p14:creationId xmlns:p14="http://schemas.microsoft.com/office/powerpoint/2010/main" val="4294828183"/>
+      </p:ext>
+    </p:extLst>
+  </p:cSld>
+  <p:clrMapOvr>
+    <a:masterClrMapping/>
+  </p:clrMapOvr>
+</p:sld>
+</file>
+
+<file path=ppt/slides/slide5.xml><?xml version="1.0" encoding="utf-8"?>
+<p:sld xmlns:a="http://schemas.openxmlformats.org/drawingml/2006/main" xmlns:r="http://schemas.openxmlformats.org/officeDocument/2006/relationships" xmlns:p="http://schemas.openxmlformats.org/presentationml/2006/main">
+  <p:cSld>
+    <p:spTree>
+      <p:nvGrpSpPr>
+        <p:cNvPr id="1" name=""/>
+        <p:cNvGrpSpPr/>
+        <p:nvPr/>
+      </p:nvGrpSpPr>
+      <p:grpSpPr>
+        <a:xfrm>
+          <a:off x="0" y="0"/>
+          <a:ext cx="0" cy="0"/>
+          <a:chOff x="0" y="0"/>
+          <a:chExt cx="0" cy="0"/>
+        </a:xfrm>
+      </p:grpSpPr>
+      <p:sp>
+        <p:nvSpPr>
+          <p:cNvPr id="2" name="Title 1">
+            <a:extLst>
+              <a:ext uri="{FF2B5EF4-FFF2-40B4-BE49-F238E27FC236}">
+                <a16:creationId xmlns:a16="http://schemas.microsoft.com/office/drawing/2014/main" id="{574F119C-EEA3-4EB2-BE31-F79ACAB60D87}"/>
+              </a:ext>
+            </a:extLst>
+          </p:cNvPr>
+          <p:cNvSpPr>
+            <a:spLocks noGrp="1"/>
+          </p:cNvSpPr>
+          <p:nvPr>
+            <p:ph type="title"/>
+          </p:nvPr>
+        </p:nvSpPr>
+        <p:spPr/>
+        <p:txBody>
+          <a:bodyPr/>
+          <a:lstStyle/>
+          <a:p>
+            <a:endParaRPr lang="en-US"/>
+          </a:p>
+        </p:txBody>
+      </p:sp>
+      <p:pic>
+        <p:nvPicPr>
+          <p:cNvPr id="5" name="Content Placeholder 4">
+            <a:extLst>
+              <a:ext uri="{FF2B5EF4-FFF2-40B4-BE49-F238E27FC236}">
+                <a16:creationId xmlns:a16="http://schemas.microsoft.com/office/drawing/2014/main" id="{5FD41C02-496E-4EAD-8354-CA8CA6457611}"/>
+              </a:ext>
+            </a:extLst>
+          </p:cNvPr>
+          <p:cNvPicPr>
+            <a:picLocks noGrp="1" noChangeAspect="1"/>
+          </p:cNvPicPr>
+          <p:nvPr>
+            <p:ph idx="1"/>
+          </p:nvPr>
+        </p:nvPicPr>
+        <p:blipFill>
+          <a:blip r:embed="rId2">
+            <a:extLst>
+              <a:ext uri="{28A0092B-C50C-407E-A947-70E740481C1C}">
+                <a14:useLocalDpi xmlns:a14="http://schemas.microsoft.com/office/drawing/2010/main" val="0"/>
+              </a:ext>
+            </a:extLst>
+          </a:blip>
+          <a:stretch>
+            <a:fillRect/>
+          </a:stretch>
+        </p:blipFill>
+        <p:spPr>
+          <a:xfrm>
+            <a:off x="677863" y="2310408"/>
+            <a:ext cx="8596312" cy="3581796"/>
+          </a:xfrm>
+        </p:spPr>
+      </p:pic>
+    </p:spTree>
+    <p:extLst>
+      <p:ext uri="{BB962C8B-B14F-4D97-AF65-F5344CB8AC3E}">
+        <p14:creationId xmlns:p14="http://schemas.microsoft.com/office/powerpoint/2010/main" val="92396245"/>
+      </p:ext>
+    </p:extLst>
+  </p:cSld>
+  <p:clrMapOvr>
+    <a:masterClrMapping/>
+  </p:clrMapOvr>
+</p:sld>
+</file>
+
+<file path=ppt/slides/slide6.xml><?xml version="1.0" encoding="utf-8"?>
 <p:sld xmlns:a="http://schemas.openxmlformats.org/drawingml/2006/main" xmlns:r="http://schemas.openxmlformats.org/officeDocument/2006/relationships" xmlns:p="http://schemas.openxmlformats.org/presentationml/2006/main">
   <p:cSld>
     <p:spTree>
@@ -6482,7 +8330,7 @@
 </p:sld>
 </file>
 
-<file path=ppt/slides/slide3.xml><?xml version="1.0" encoding="utf-8"?>
+<file path=ppt/slides/slide7.xml><?xml version="1.0" encoding="utf-8"?>
 <p:sld xmlns:a="http://schemas.openxmlformats.org/drawingml/2006/main" xmlns:r="http://schemas.openxmlformats.org/officeDocument/2006/relationships" xmlns:p="http://schemas.openxmlformats.org/presentationml/2006/main">
   <p:cSld>
     <p:spTree>
@@ -6572,7 +8420,7 @@
 </p:sld>
 </file>
 
-<file path=ppt/slides/slide4.xml><?xml version="1.0" encoding="utf-8"?>
+<file path=ppt/slides/slide8.xml><?xml version="1.0" encoding="utf-8"?>
 <p:sld xmlns:a="http://schemas.openxmlformats.org/drawingml/2006/main" xmlns:r="http://schemas.openxmlformats.org/officeDocument/2006/relationships" xmlns:p="http://schemas.openxmlformats.org/presentationml/2006/main">
   <p:cSld>
     <p:spTree>
@@ -6662,7 +8510,7 @@
 </p:sld>
 </file>
 
-<file path=ppt/slides/slide5.xml><?xml version="1.0" encoding="utf-8"?>
+<file path=ppt/slides/slide9.xml><?xml version="1.0" encoding="utf-8"?>
 <p:sld xmlns:a="http://schemas.openxmlformats.org/drawingml/2006/main" xmlns:r="http://schemas.openxmlformats.org/officeDocument/2006/relationships" xmlns:p="http://schemas.openxmlformats.org/presentationml/2006/main">
   <p:cSld>
     <p:spTree>
@@ -6743,365 +8591,6 @@
     <p:extLst>
       <p:ext uri="{BB962C8B-B14F-4D97-AF65-F5344CB8AC3E}">
         <p14:creationId xmlns:p14="http://schemas.microsoft.com/office/powerpoint/2010/main" val="295353461"/>
-      </p:ext>
-    </p:extLst>
-  </p:cSld>
-  <p:clrMapOvr>
-    <a:masterClrMapping/>
-  </p:clrMapOvr>
-</p:sld>
-</file>
-
-<file path=ppt/slides/slide6.xml><?xml version="1.0" encoding="utf-8"?>
-<p:sld xmlns:a="http://schemas.openxmlformats.org/drawingml/2006/main" xmlns:r="http://schemas.openxmlformats.org/officeDocument/2006/relationships" xmlns:p="http://schemas.openxmlformats.org/presentationml/2006/main">
-  <p:cSld>
-    <p:spTree>
-      <p:nvGrpSpPr>
-        <p:cNvPr id="1" name=""/>
-        <p:cNvGrpSpPr/>
-        <p:nvPr/>
-      </p:nvGrpSpPr>
-      <p:grpSpPr>
-        <a:xfrm>
-          <a:off x="0" y="0"/>
-          <a:ext cx="0" cy="0"/>
-          <a:chOff x="0" y="0"/>
-          <a:chExt cx="0" cy="0"/>
-        </a:xfrm>
-      </p:grpSpPr>
-      <p:sp>
-        <p:nvSpPr>
-          <p:cNvPr id="2" name="Title 1">
-            <a:extLst>
-              <a:ext uri="{FF2B5EF4-FFF2-40B4-BE49-F238E27FC236}">
-                <a16:creationId xmlns:a16="http://schemas.microsoft.com/office/drawing/2014/main" id="{9F2FC880-1F23-4B21-BF8B-8F83C578D037}"/>
-              </a:ext>
-            </a:extLst>
-          </p:cNvPr>
-          <p:cNvSpPr>
-            <a:spLocks noGrp="1"/>
-          </p:cNvSpPr>
-          <p:nvPr>
-            <p:ph type="title"/>
-          </p:nvPr>
-        </p:nvSpPr>
-        <p:spPr/>
-        <p:txBody>
-          <a:bodyPr/>
-          <a:lstStyle/>
-          <a:p>
-            <a:endParaRPr lang="en-US"/>
-          </a:p>
-        </p:txBody>
-      </p:sp>
-      <p:pic>
-        <p:nvPicPr>
-          <p:cNvPr id="5" name="Content Placeholder 4">
-            <a:extLst>
-              <a:ext uri="{FF2B5EF4-FFF2-40B4-BE49-F238E27FC236}">
-                <a16:creationId xmlns:a16="http://schemas.microsoft.com/office/drawing/2014/main" id="{4C75B6EC-F102-41D3-8E7B-B9FC45CD8F9B}"/>
-              </a:ext>
-            </a:extLst>
-          </p:cNvPr>
-          <p:cNvPicPr>
-            <a:picLocks noGrp="1" noChangeAspect="1"/>
-          </p:cNvPicPr>
-          <p:nvPr>
-            <p:ph idx="1"/>
-          </p:nvPr>
-        </p:nvPicPr>
-        <p:blipFill>
-          <a:blip r:embed="rId2">
-            <a:extLst>
-              <a:ext uri="{28A0092B-C50C-407E-A947-70E740481C1C}">
-                <a14:useLocalDpi xmlns:a14="http://schemas.microsoft.com/office/drawing/2010/main" val="0"/>
-              </a:ext>
-            </a:extLst>
-          </a:blip>
-          <a:stretch>
-            <a:fillRect/>
-          </a:stretch>
-        </p:blipFill>
-        <p:spPr>
-          <a:xfrm>
-            <a:off x="265019" y="999424"/>
-            <a:ext cx="11661961" cy="4859151"/>
-          </a:xfrm>
-        </p:spPr>
-      </p:pic>
-    </p:spTree>
-    <p:extLst>
-      <p:ext uri="{BB962C8B-B14F-4D97-AF65-F5344CB8AC3E}">
-        <p14:creationId xmlns:p14="http://schemas.microsoft.com/office/powerpoint/2010/main" val="2348836302"/>
-      </p:ext>
-    </p:extLst>
-  </p:cSld>
-  <p:clrMapOvr>
-    <a:masterClrMapping/>
-  </p:clrMapOvr>
-</p:sld>
-</file>
-
-<file path=ppt/slides/slide7.xml><?xml version="1.0" encoding="utf-8"?>
-<p:sld xmlns:a="http://schemas.openxmlformats.org/drawingml/2006/main" xmlns:r="http://schemas.openxmlformats.org/officeDocument/2006/relationships" xmlns:p="http://schemas.openxmlformats.org/presentationml/2006/main">
-  <p:cSld>
-    <p:spTree>
-      <p:nvGrpSpPr>
-        <p:cNvPr id="1" name=""/>
-        <p:cNvGrpSpPr/>
-        <p:nvPr/>
-      </p:nvGrpSpPr>
-      <p:grpSpPr>
-        <a:xfrm>
-          <a:off x="0" y="0"/>
-          <a:ext cx="0" cy="0"/>
-          <a:chOff x="0" y="0"/>
-          <a:chExt cx="0" cy="0"/>
-        </a:xfrm>
-      </p:grpSpPr>
-      <p:sp>
-        <p:nvSpPr>
-          <p:cNvPr id="2" name="Title 1">
-            <a:extLst>
-              <a:ext uri="{FF2B5EF4-FFF2-40B4-BE49-F238E27FC236}">
-                <a16:creationId xmlns:a16="http://schemas.microsoft.com/office/drawing/2014/main" id="{6679D015-EEB7-44D6-9A8B-E5B1D27516E9}"/>
-              </a:ext>
-            </a:extLst>
-          </p:cNvPr>
-          <p:cNvSpPr>
-            <a:spLocks noGrp="1"/>
-          </p:cNvSpPr>
-          <p:nvPr>
-            <p:ph type="title"/>
-          </p:nvPr>
-        </p:nvSpPr>
-        <p:spPr/>
-        <p:txBody>
-          <a:bodyPr/>
-          <a:lstStyle/>
-          <a:p>
-            <a:endParaRPr lang="en-US"/>
-          </a:p>
-        </p:txBody>
-      </p:sp>
-      <p:pic>
-        <p:nvPicPr>
-          <p:cNvPr id="5" name="Content Placeholder 4">
-            <a:extLst>
-              <a:ext uri="{FF2B5EF4-FFF2-40B4-BE49-F238E27FC236}">
-                <a16:creationId xmlns:a16="http://schemas.microsoft.com/office/drawing/2014/main" id="{D03A0EDE-77F2-4981-849F-C23D3450E904}"/>
-              </a:ext>
-            </a:extLst>
-          </p:cNvPr>
-          <p:cNvPicPr>
-            <a:picLocks noGrp="1" noChangeAspect="1"/>
-          </p:cNvPicPr>
-          <p:nvPr>
-            <p:ph idx="1"/>
-          </p:nvPr>
-        </p:nvPicPr>
-        <p:blipFill>
-          <a:blip r:embed="rId2">
-            <a:extLst>
-              <a:ext uri="{28A0092B-C50C-407E-A947-70E740481C1C}">
-                <a14:useLocalDpi xmlns:a14="http://schemas.microsoft.com/office/drawing/2010/main" val="0"/>
-              </a:ext>
-            </a:extLst>
-          </a:blip>
-          <a:stretch>
-            <a:fillRect/>
-          </a:stretch>
-        </p:blipFill>
-        <p:spPr>
-          <a:xfrm>
-            <a:off x="1180694" y="623574"/>
-            <a:ext cx="9830611" cy="5610851"/>
-          </a:xfrm>
-        </p:spPr>
-      </p:pic>
-    </p:spTree>
-    <p:extLst>
-      <p:ext uri="{BB962C8B-B14F-4D97-AF65-F5344CB8AC3E}">
-        <p14:creationId xmlns:p14="http://schemas.microsoft.com/office/powerpoint/2010/main" val="2525985050"/>
-      </p:ext>
-    </p:extLst>
-  </p:cSld>
-  <p:clrMapOvr>
-    <a:masterClrMapping/>
-  </p:clrMapOvr>
-</p:sld>
-</file>
-
-<file path=ppt/slides/slide8.xml><?xml version="1.0" encoding="utf-8"?>
-<p:sld xmlns:a="http://schemas.openxmlformats.org/drawingml/2006/main" xmlns:r="http://schemas.openxmlformats.org/officeDocument/2006/relationships" xmlns:p="http://schemas.openxmlformats.org/presentationml/2006/main">
-  <p:cSld>
-    <p:spTree>
-      <p:nvGrpSpPr>
-        <p:cNvPr id="1" name=""/>
-        <p:cNvGrpSpPr/>
-        <p:nvPr/>
-      </p:nvGrpSpPr>
-      <p:grpSpPr>
-        <a:xfrm>
-          <a:off x="0" y="0"/>
-          <a:ext cx="0" cy="0"/>
-          <a:chOff x="0" y="0"/>
-          <a:chExt cx="0" cy="0"/>
-        </a:xfrm>
-      </p:grpSpPr>
-      <p:sp>
-        <p:nvSpPr>
-          <p:cNvPr id="2" name="Title 1">
-            <a:extLst>
-              <a:ext uri="{FF2B5EF4-FFF2-40B4-BE49-F238E27FC236}">
-                <a16:creationId xmlns:a16="http://schemas.microsoft.com/office/drawing/2014/main" id="{F100986A-2B16-4D98-8296-3807E41CA447}"/>
-              </a:ext>
-            </a:extLst>
-          </p:cNvPr>
-          <p:cNvSpPr>
-            <a:spLocks noGrp="1"/>
-          </p:cNvSpPr>
-          <p:nvPr>
-            <p:ph type="title"/>
-          </p:nvPr>
-        </p:nvSpPr>
-        <p:spPr/>
-        <p:txBody>
-          <a:bodyPr/>
-          <a:lstStyle/>
-          <a:p>
-            <a:endParaRPr lang="en-US"/>
-          </a:p>
-        </p:txBody>
-      </p:sp>
-      <p:pic>
-        <p:nvPicPr>
-          <p:cNvPr id="5" name="Content Placeholder 4">
-            <a:extLst>
-              <a:ext uri="{FF2B5EF4-FFF2-40B4-BE49-F238E27FC236}">
-                <a16:creationId xmlns:a16="http://schemas.microsoft.com/office/drawing/2014/main" id="{42DFD729-14D3-4FC7-937B-950F03115C26}"/>
-              </a:ext>
-            </a:extLst>
-          </p:cNvPr>
-          <p:cNvPicPr>
-            <a:picLocks noGrp="1" noChangeAspect="1"/>
-          </p:cNvPicPr>
-          <p:nvPr>
-            <p:ph idx="1"/>
-          </p:nvPr>
-        </p:nvPicPr>
-        <p:blipFill>
-          <a:blip r:embed="rId2">
-            <a:extLst>
-              <a:ext uri="{28A0092B-C50C-407E-A947-70E740481C1C}">
-                <a14:useLocalDpi xmlns:a14="http://schemas.microsoft.com/office/drawing/2010/main" val="0"/>
-              </a:ext>
-            </a:extLst>
-          </a:blip>
-          <a:stretch>
-            <a:fillRect/>
-          </a:stretch>
-        </p:blipFill>
-        <p:spPr>
-          <a:xfrm>
-            <a:off x="1267327" y="129465"/>
-            <a:ext cx="9898604" cy="6599069"/>
-          </a:xfrm>
-        </p:spPr>
-      </p:pic>
-    </p:spTree>
-    <p:extLst>
-      <p:ext uri="{BB962C8B-B14F-4D97-AF65-F5344CB8AC3E}">
-        <p14:creationId xmlns:p14="http://schemas.microsoft.com/office/powerpoint/2010/main" val="1855985092"/>
-      </p:ext>
-    </p:extLst>
-  </p:cSld>
-  <p:clrMapOvr>
-    <a:masterClrMapping/>
-  </p:clrMapOvr>
-</p:sld>
-</file>
-
-<file path=ppt/slides/slide9.xml><?xml version="1.0" encoding="utf-8"?>
-<p:sld xmlns:a="http://schemas.openxmlformats.org/drawingml/2006/main" xmlns:r="http://schemas.openxmlformats.org/officeDocument/2006/relationships" xmlns:p="http://schemas.openxmlformats.org/presentationml/2006/main">
-  <p:cSld>
-    <p:spTree>
-      <p:nvGrpSpPr>
-        <p:cNvPr id="1" name=""/>
-        <p:cNvGrpSpPr/>
-        <p:nvPr/>
-      </p:nvGrpSpPr>
-      <p:grpSpPr>
-        <a:xfrm>
-          <a:off x="0" y="0"/>
-          <a:ext cx="0" cy="0"/>
-          <a:chOff x="0" y="0"/>
-          <a:chExt cx="0" cy="0"/>
-        </a:xfrm>
-      </p:grpSpPr>
-      <p:sp>
-        <p:nvSpPr>
-          <p:cNvPr id="2" name="Title 1">
-            <a:extLst>
-              <a:ext uri="{FF2B5EF4-FFF2-40B4-BE49-F238E27FC236}">
-                <a16:creationId xmlns:a16="http://schemas.microsoft.com/office/drawing/2014/main" id="{7E781093-2703-4C82-9B8F-C3E838AF4A95}"/>
-              </a:ext>
-            </a:extLst>
-          </p:cNvPr>
-          <p:cNvSpPr>
-            <a:spLocks noGrp="1"/>
-          </p:cNvSpPr>
-          <p:nvPr>
-            <p:ph type="title"/>
-          </p:nvPr>
-        </p:nvSpPr>
-        <p:spPr/>
-        <p:txBody>
-          <a:bodyPr/>
-          <a:lstStyle/>
-          <a:p>
-            <a:endParaRPr lang="en-US"/>
-          </a:p>
-        </p:txBody>
-      </p:sp>
-      <p:pic>
-        <p:nvPicPr>
-          <p:cNvPr id="5" name="Content Placeholder 4">
-            <a:extLst>
-              <a:ext uri="{FF2B5EF4-FFF2-40B4-BE49-F238E27FC236}">
-                <a16:creationId xmlns:a16="http://schemas.microsoft.com/office/drawing/2014/main" id="{110EC511-B753-4FA0-AD33-2FC81B57351C}"/>
-              </a:ext>
-            </a:extLst>
-          </p:cNvPr>
-          <p:cNvPicPr>
-            <a:picLocks noGrp="1" noChangeAspect="1"/>
-          </p:cNvPicPr>
-          <p:nvPr>
-            <p:ph idx="1"/>
-          </p:nvPr>
-        </p:nvPicPr>
-        <p:blipFill rotWithShape="1">
-          <a:blip r:embed="rId2">
-            <a:extLst>
-              <a:ext uri="{28A0092B-C50C-407E-A947-70E740481C1C}">
-                <a14:useLocalDpi xmlns:a14="http://schemas.microsoft.com/office/drawing/2010/main" val="0"/>
-              </a:ext>
-            </a:extLst>
-          </a:blip>
-          <a:srcRect l="6687" r="7719"/>
-          <a:stretch/>
-        </p:blipFill>
-        <p:spPr>
-          <a:xfrm>
-            <a:off x="100523" y="365125"/>
-            <a:ext cx="12091477" cy="5889207"/>
-          </a:xfrm>
-        </p:spPr>
-      </p:pic>
-    </p:spTree>
-    <p:extLst>
-      <p:ext uri="{BB962C8B-B14F-4D97-AF65-F5344CB8AC3E}">
-        <p14:creationId xmlns:p14="http://schemas.microsoft.com/office/powerpoint/2010/main" val="2484642320"/>
       </p:ext>
     </p:extLst>
   </p:cSld>

</xml_diff>

<commit_message>
added final pres with polar bear
</commit_message>
<xml_diff>
--- a/Presentation1.pptx
+++ b/Presentation1.pptx
@@ -866,7 +866,7 @@
           <a:p>
             <a:fld id="{010A7FB3-A316-402C-99FC-ECFF33919AD8}" type="datetimeFigureOut">
               <a:rPr lang="en-US" smtClean="0"/>
-              <a:t>4/12/2019</a:t>
+              <a:t>4/13/2019</a:t>
             </a:fld>
             <a:endParaRPr lang="en-US"/>
           </a:p>
@@ -1117,7 +1117,7 @@
           <a:p>
             <a:fld id="{010A7FB3-A316-402C-99FC-ECFF33919AD8}" type="datetimeFigureOut">
               <a:rPr lang="en-US" smtClean="0"/>
-              <a:t>4/12/2019</a:t>
+              <a:t>4/13/2019</a:t>
             </a:fld>
             <a:endParaRPr lang="en-US"/>
           </a:p>
@@ -1431,7 +1431,7 @@
           <a:p>
             <a:fld id="{010A7FB3-A316-402C-99FC-ECFF33919AD8}" type="datetimeFigureOut">
               <a:rPr lang="en-US" smtClean="0"/>
-              <a:t>4/12/2019</a:t>
+              <a:t>4/13/2019</a:t>
             </a:fld>
             <a:endParaRPr lang="en-US"/>
           </a:p>
@@ -1772,7 +1772,7 @@
           <a:p>
             <a:fld id="{010A7FB3-A316-402C-99FC-ECFF33919AD8}" type="datetimeFigureOut">
               <a:rPr lang="en-US" smtClean="0"/>
-              <a:t>4/12/2019</a:t>
+              <a:t>4/13/2019</a:t>
             </a:fld>
             <a:endParaRPr lang="en-US"/>
           </a:p>
@@ -2086,7 +2086,7 @@
           <a:p>
             <a:fld id="{010A7FB3-A316-402C-99FC-ECFF33919AD8}" type="datetimeFigureOut">
               <a:rPr lang="en-US" smtClean="0"/>
-              <a:t>4/12/2019</a:t>
+              <a:t>4/13/2019</a:t>
             </a:fld>
             <a:endParaRPr lang="en-US"/>
           </a:p>
@@ -2479,7 +2479,7 @@
           <a:p>
             <a:fld id="{010A7FB3-A316-402C-99FC-ECFF33919AD8}" type="datetimeFigureOut">
               <a:rPr lang="en-US" smtClean="0"/>
-              <a:t>4/12/2019</a:t>
+              <a:t>4/13/2019</a:t>
             </a:fld>
             <a:endParaRPr lang="en-US"/>
           </a:p>
@@ -2649,7 +2649,7 @@
           <a:p>
             <a:fld id="{010A7FB3-A316-402C-99FC-ECFF33919AD8}" type="datetimeFigureOut">
               <a:rPr lang="en-US" smtClean="0"/>
-              <a:t>4/12/2019</a:t>
+              <a:t>4/13/2019</a:t>
             </a:fld>
             <a:endParaRPr lang="en-US"/>
           </a:p>
@@ -2829,7 +2829,7 @@
           <a:p>
             <a:fld id="{010A7FB3-A316-402C-99FC-ECFF33919AD8}" type="datetimeFigureOut">
               <a:rPr lang="en-US" smtClean="0"/>
-              <a:t>4/12/2019</a:t>
+              <a:t>4/13/2019</a:t>
             </a:fld>
             <a:endParaRPr lang="en-US"/>
           </a:p>
@@ -3005,7 +3005,7 @@
           <a:p>
             <a:fld id="{010A7FB3-A316-402C-99FC-ECFF33919AD8}" type="datetimeFigureOut">
               <a:rPr lang="en-US" smtClean="0"/>
-              <a:t>4/12/2019</a:t>
+              <a:t>4/13/2019</a:t>
             </a:fld>
             <a:endParaRPr lang="en-US"/>
           </a:p>
@@ -3252,7 +3252,7 @@
           <a:p>
             <a:fld id="{010A7FB3-A316-402C-99FC-ECFF33919AD8}" type="datetimeFigureOut">
               <a:rPr lang="en-US" smtClean="0"/>
-              <a:t>4/12/2019</a:t>
+              <a:t>4/13/2019</a:t>
             </a:fld>
             <a:endParaRPr lang="en-US"/>
           </a:p>
@@ -3484,7 +3484,7 @@
           <a:p>
             <a:fld id="{010A7FB3-A316-402C-99FC-ECFF33919AD8}" type="datetimeFigureOut">
               <a:rPr lang="en-US" smtClean="0"/>
-              <a:t>4/12/2019</a:t>
+              <a:t>4/13/2019</a:t>
             </a:fld>
             <a:endParaRPr lang="en-US"/>
           </a:p>
@@ -3858,7 +3858,7 @@
           <a:p>
             <a:fld id="{010A7FB3-A316-402C-99FC-ECFF33919AD8}" type="datetimeFigureOut">
               <a:rPr lang="en-US" smtClean="0"/>
-              <a:t>4/12/2019</a:t>
+              <a:t>4/13/2019</a:t>
             </a:fld>
             <a:endParaRPr lang="en-US"/>
           </a:p>
@@ -3981,7 +3981,7 @@
           <a:p>
             <a:fld id="{010A7FB3-A316-402C-99FC-ECFF33919AD8}" type="datetimeFigureOut">
               <a:rPr lang="en-US" smtClean="0"/>
-              <a:t>4/12/2019</a:t>
+              <a:t>4/13/2019</a:t>
             </a:fld>
             <a:endParaRPr lang="en-US"/>
           </a:p>
@@ -4076,7 +4076,7 @@
           <a:p>
             <a:fld id="{010A7FB3-A316-402C-99FC-ECFF33919AD8}" type="datetimeFigureOut">
               <a:rPr lang="en-US" smtClean="0"/>
-              <a:t>4/12/2019</a:t>
+              <a:t>4/13/2019</a:t>
             </a:fld>
             <a:endParaRPr lang="en-US"/>
           </a:p>
@@ -4331,7 +4331,7 @@
           <a:p>
             <a:fld id="{010A7FB3-A316-402C-99FC-ECFF33919AD8}" type="datetimeFigureOut">
               <a:rPr lang="en-US" smtClean="0"/>
-              <a:t>4/12/2019</a:t>
+              <a:t>4/13/2019</a:t>
             </a:fld>
             <a:endParaRPr lang="en-US"/>
           </a:p>
@@ -4594,7 +4594,7 @@
           <a:p>
             <a:fld id="{010A7FB3-A316-402C-99FC-ECFF33919AD8}" type="datetimeFigureOut">
               <a:rPr lang="en-US" smtClean="0"/>
-              <a:t>4/12/2019</a:t>
+              <a:t>4/13/2019</a:t>
             </a:fld>
             <a:endParaRPr lang="en-US"/>
           </a:p>
@@ -5337,7 +5337,7 @@
           <a:p>
             <a:fld id="{010A7FB3-A316-402C-99FC-ECFF33919AD8}" type="datetimeFigureOut">
               <a:rPr lang="en-US" smtClean="0"/>
-              <a:t>4/12/2019</a:t>
+              <a:t>4/13/2019</a:t>
             </a:fld>
             <a:endParaRPr lang="en-US"/>
           </a:p>
@@ -8652,7 +8652,7 @@
           <a:p>
             <a:r>
               <a:rPr lang="en-US" dirty="0"/>
-              <a:t>Limits of the data</a:t>
+              <a:t>There are some limits to the data. </a:t>
             </a:r>
           </a:p>
         </p:txBody>

</xml_diff>